<commit_message>
Updated Powerpoint (but only sort of).
</commit_message>
<xml_diff>
--- a/CIS-700.pptx
+++ b/CIS-700.pptx
@@ -10,8 +10,9 @@
     <p:sldId id="259" r:id="rId4"/>
     <p:sldId id="257" r:id="rId5"/>
     <p:sldId id="260" r:id="rId6"/>
-    <p:sldId id="261" r:id="rId7"/>
-    <p:sldId id="262" r:id="rId8"/>
+    <p:sldId id="263" r:id="rId7"/>
+    <p:sldId id="261" r:id="rId8"/>
+    <p:sldId id="262" r:id="rId9"/>
   </p:sldIdLst>
   <p:sldSz cx="12192000" cy="6858000"/>
   <p:notesSz cx="6858000" cy="9144000"/>
@@ -348,7 +349,7 @@
             <a:fld id="{B61BEF0D-F0BB-DE4B-95CE-6DB70DBA9567}" type="datetimeFigureOut">
               <a:rPr lang="en-US" dirty="0"/>
               <a:pPr/>
-              <a:t>6/4/18</a:t>
+              <a:t>6/6/18</a:t>
             </a:fld>
             <a:endParaRPr lang="en-US" dirty="0"/>
           </a:p>
@@ -679,7 +680,7 @@
             <a:fld id="{B61BEF0D-F0BB-DE4B-95CE-6DB70DBA9567}" type="datetimeFigureOut">
               <a:rPr lang="en-US" dirty="0"/>
               <a:pPr/>
-              <a:t>6/4/18</a:t>
+              <a:t>6/6/18</a:t>
             </a:fld>
             <a:endParaRPr lang="en-US" dirty="0"/>
           </a:p>
@@ -954,7 +955,7 @@
             <a:fld id="{B61BEF0D-F0BB-DE4B-95CE-6DB70DBA9567}" type="datetimeFigureOut">
               <a:rPr lang="en-US" dirty="0"/>
               <a:pPr/>
-              <a:t>6/4/18</a:t>
+              <a:t>6/6/18</a:t>
             </a:fld>
             <a:endParaRPr lang="en-US" dirty="0"/>
           </a:p>
@@ -1519,7 +1520,7 @@
             <a:fld id="{B61BEF0D-F0BB-DE4B-95CE-6DB70DBA9567}" type="datetimeFigureOut">
               <a:rPr lang="en-US" dirty="0"/>
               <a:pPr/>
-              <a:t>6/4/18</a:t>
+              <a:t>6/6/18</a:t>
             </a:fld>
             <a:endParaRPr lang="en-US" dirty="0"/>
           </a:p>
@@ -1794,7 +1795,7 @@
             <a:fld id="{B61BEF0D-F0BB-DE4B-95CE-6DB70DBA9567}" type="datetimeFigureOut">
               <a:rPr lang="en-US" dirty="0"/>
               <a:pPr/>
-              <a:t>6/4/18</a:t>
+              <a:t>6/6/18</a:t>
             </a:fld>
             <a:endParaRPr lang="en-US" dirty="0"/>
           </a:p>
@@ -2353,7 +2354,7 @@
             <a:fld id="{B61BEF0D-F0BB-DE4B-95CE-6DB70DBA9567}" type="datetimeFigureOut">
               <a:rPr lang="en-US" dirty="0"/>
               <a:pPr/>
-              <a:t>6/4/18</a:t>
+              <a:t>6/6/18</a:t>
             </a:fld>
             <a:endParaRPr lang="en-US" dirty="0"/>
           </a:p>
@@ -2677,7 +2678,7 @@
             <a:fld id="{B61BEF0D-F0BB-DE4B-95CE-6DB70DBA9567}" type="datetimeFigureOut">
               <a:rPr lang="en-US" dirty="0"/>
               <a:pPr/>
-              <a:t>6/4/18</a:t>
+              <a:t>6/6/18</a:t>
             </a:fld>
             <a:endParaRPr lang="en-US" dirty="0"/>
           </a:p>
@@ -2851,7 +2852,7 @@
             <a:fld id="{B61BEF0D-F0BB-DE4B-95CE-6DB70DBA9567}" type="datetimeFigureOut">
               <a:rPr lang="en-US" dirty="0"/>
               <a:pPr/>
-              <a:t>6/4/18</a:t>
+              <a:t>6/6/18</a:t>
             </a:fld>
             <a:endParaRPr lang="en-US" dirty="0"/>
           </a:p>
@@ -3086,7 +3087,7 @@
             <a:fld id="{B61BEF0D-F0BB-DE4B-95CE-6DB70DBA9567}" type="datetimeFigureOut">
               <a:rPr lang="en-US" dirty="0"/>
               <a:pPr/>
-              <a:t>6/4/18</a:t>
+              <a:t>6/6/18</a:t>
             </a:fld>
             <a:endParaRPr lang="en-US" dirty="0"/>
           </a:p>
@@ -3283,7 +3284,7 @@
             <a:fld id="{B61BEF0D-F0BB-DE4B-95CE-6DB70DBA9567}" type="datetimeFigureOut">
               <a:rPr lang="en-US" dirty="0"/>
               <a:pPr/>
-              <a:t>6/4/18</a:t>
+              <a:t>6/6/18</a:t>
             </a:fld>
             <a:endParaRPr lang="en-US" dirty="0"/>
           </a:p>
@@ -3556,7 +3557,7 @@
             <a:fld id="{B61BEF0D-F0BB-DE4B-95CE-6DB70DBA9567}" type="datetimeFigureOut">
               <a:rPr lang="en-US" dirty="0"/>
               <a:pPr/>
-              <a:t>6/4/18</a:t>
+              <a:t>6/6/18</a:t>
             </a:fld>
             <a:endParaRPr lang="en-US" dirty="0"/>
           </a:p>
@@ -3819,7 +3820,7 @@
             <a:fld id="{B61BEF0D-F0BB-DE4B-95CE-6DB70DBA9567}" type="datetimeFigureOut">
               <a:rPr lang="en-US" dirty="0"/>
               <a:pPr/>
-              <a:t>6/4/18</a:t>
+              <a:t>6/6/18</a:t>
             </a:fld>
             <a:endParaRPr lang="en-US" dirty="0"/>
           </a:p>
@@ -4190,7 +4191,7 @@
             <a:fld id="{B61BEF0D-F0BB-DE4B-95CE-6DB70DBA9567}" type="datetimeFigureOut">
               <a:rPr lang="en-US" dirty="0"/>
               <a:pPr/>
-              <a:t>6/4/18</a:t>
+              <a:t>6/6/18</a:t>
             </a:fld>
             <a:endParaRPr lang="en-US" dirty="0"/>
           </a:p>
@@ -4335,7 +4336,7 @@
             <a:fld id="{B61BEF0D-F0BB-DE4B-95CE-6DB70DBA9567}" type="datetimeFigureOut">
               <a:rPr lang="en-US" dirty="0"/>
               <a:pPr/>
-              <a:t>6/4/18</a:t>
+              <a:t>6/6/18</a:t>
             </a:fld>
             <a:endParaRPr lang="en-US" dirty="0"/>
           </a:p>
@@ -4457,7 +4458,7 @@
             <a:fld id="{B61BEF0D-F0BB-DE4B-95CE-6DB70DBA9567}" type="datetimeFigureOut">
               <a:rPr lang="en-US" dirty="0"/>
               <a:pPr/>
-              <a:t>6/4/18</a:t>
+              <a:t>6/6/18</a:t>
             </a:fld>
             <a:endParaRPr lang="en-US" dirty="0"/>
           </a:p>
@@ -4739,7 +4740,7 @@
             <a:fld id="{B61BEF0D-F0BB-DE4B-95CE-6DB70DBA9567}" type="datetimeFigureOut">
               <a:rPr lang="en-US" dirty="0"/>
               <a:pPr/>
-              <a:t>6/4/18</a:t>
+              <a:t>6/6/18</a:t>
             </a:fld>
             <a:endParaRPr lang="en-US" dirty="0"/>
           </a:p>
@@ -5060,7 +5061,7 @@
             <a:fld id="{B61BEF0D-F0BB-DE4B-95CE-6DB70DBA9567}" type="datetimeFigureOut">
               <a:rPr lang="en-US" dirty="0"/>
               <a:pPr/>
-              <a:t>6/4/18</a:t>
+              <a:t>6/6/18</a:t>
             </a:fld>
             <a:endParaRPr lang="en-US" dirty="0"/>
           </a:p>
@@ -5271,7 +5272,7 @@
             <a:fld id="{B61BEF0D-F0BB-DE4B-95CE-6DB70DBA9567}" type="datetimeFigureOut">
               <a:rPr lang="en-US" dirty="0"/>
               <a:pPr/>
-              <a:t>6/4/18</a:t>
+              <a:t>6/6/18</a:t>
             </a:fld>
             <a:endParaRPr lang="en-US" dirty="0"/>
           </a:p>
@@ -6214,7 +6215,7 @@
           <a:p>
             <a:r>
               <a:rPr lang="en-US" dirty="0"/>
-              <a:t>The fine-grain detail is difficult to emulate, and is thus a good authentication feature. </a:t>
+              <a:t>The level of fine-grain detail is difficult to emulate, and is thus a good authentication feature. </a:t>
             </a:r>
           </a:p>
         </p:txBody>
@@ -6615,7 +6616,7 @@
         </p:spPr>
         <p:txBody>
           <a:bodyPr>
-            <a:normAutofit/>
+            <a:normAutofit fontScale="92500"/>
           </a:bodyPr>
           <a:lstStyle/>
           <a:p>
@@ -6665,21 +6666,35 @@
           <a:p>
             <a:r>
               <a:rPr lang="en-US" dirty="0"/>
-              <a:t>Took pictures of Regions of Interest (picked based on domain knowledge).</a:t>
+              <a:t>Four step process:</a:t>
             </a:r>
           </a:p>
           <a:p>
             <a:pPr lvl="1"/>
             <a:r>
               <a:rPr lang="en-US" dirty="0"/>
-              <a:t>Averaged their mean gray values, and threw out non-homogeneous areas.</a:t>
+              <a:t>Image digitization using areas of homogeneous grayscale mean.</a:t>
             </a:r>
           </a:p>
           <a:p>
             <a:pPr lvl="1"/>
             <a:r>
               <a:rPr lang="en-US" dirty="0"/>
-              <a:t>Homogeneity implied level of detail in original print.</a:t>
+              <a:t>Preprocessing </a:t>
+            </a:r>
+          </a:p>
+          <a:p>
+            <a:pPr lvl="1"/>
+            <a:r>
+              <a:rPr lang="en-US" dirty="0"/>
+              <a:t>Feature extraction</a:t>
+            </a:r>
+          </a:p>
+          <a:p>
+            <a:pPr lvl="1"/>
+            <a:r>
+              <a:rPr lang="en-US" dirty="0"/>
+              <a:t>Classification</a:t>
             </a:r>
           </a:p>
         </p:txBody>
@@ -6835,6 +6850,89 @@
           <p:cNvPr id="2" name="Title 1">
             <a:extLst>
               <a:ext uri="{FF2B5EF4-FFF2-40B4-BE49-F238E27FC236}">
+                <a16:creationId xmlns:a16="http://schemas.microsoft.com/office/drawing/2014/main" id="{B90A36D4-E471-F944-B348-66E33387CF43}"/>
+              </a:ext>
+            </a:extLst>
+          </p:cNvPr>
+          <p:cNvSpPr>
+            <a:spLocks noGrp="1"/>
+          </p:cNvSpPr>
+          <p:nvPr>
+            <p:ph type="title"/>
+          </p:nvPr>
+        </p:nvSpPr>
+        <p:spPr/>
+        <p:txBody>
+          <a:bodyPr/>
+          <a:lstStyle/>
+          <a:p>
+            <a:r>
+              <a:rPr lang="en-US" dirty="0"/>
+              <a:t>THEIR FINDINGS (INCOMPLETE)</a:t>
+            </a:r>
+          </a:p>
+        </p:txBody>
+      </p:sp>
+      <p:sp>
+        <p:nvSpPr>
+          <p:cNvPr id="3" name="Content Placeholder 2">
+            <a:extLst>
+              <a:ext uri="{FF2B5EF4-FFF2-40B4-BE49-F238E27FC236}">
+                <a16:creationId xmlns:a16="http://schemas.microsoft.com/office/drawing/2014/main" id="{8F3E59D1-6098-B043-8F22-F177550ACB36}"/>
+              </a:ext>
+            </a:extLst>
+          </p:cNvPr>
+          <p:cNvSpPr>
+            <a:spLocks noGrp="1"/>
+          </p:cNvSpPr>
+          <p:nvPr>
+            <p:ph idx="1"/>
+          </p:nvPr>
+        </p:nvSpPr>
+        <p:spPr/>
+        <p:txBody>
+          <a:bodyPr/>
+          <a:lstStyle/>
+          <a:p>
+            <a:endParaRPr lang="en-US"/>
+          </a:p>
+        </p:txBody>
+      </p:sp>
+    </p:spTree>
+    <p:extLst>
+      <p:ext uri="{BB962C8B-B14F-4D97-AF65-F5344CB8AC3E}">
+        <p14:creationId xmlns:p14="http://schemas.microsoft.com/office/powerpoint/2010/main" val="1503085697"/>
+      </p:ext>
+    </p:extLst>
+  </p:cSld>
+  <p:clrMapOvr>
+    <a:masterClrMapping/>
+  </p:clrMapOvr>
+</p:sld>
+</file>
+
+<file path=ppt/slides/slide7.xml><?xml version="1.0" encoding="utf-8"?>
+<p:sld xmlns:a="http://schemas.openxmlformats.org/drawingml/2006/main" xmlns:r="http://schemas.openxmlformats.org/officeDocument/2006/relationships" xmlns:p="http://schemas.openxmlformats.org/presentationml/2006/main">
+  <p:cSld>
+    <p:spTree>
+      <p:nvGrpSpPr>
+        <p:cNvPr id="1" name=""/>
+        <p:cNvGrpSpPr/>
+        <p:nvPr/>
+      </p:nvGrpSpPr>
+      <p:grpSpPr>
+        <a:xfrm>
+          <a:off x="0" y="0"/>
+          <a:ext cx="0" cy="0"/>
+          <a:chOff x="0" y="0"/>
+          <a:chExt cx="0" cy="0"/>
+        </a:xfrm>
+      </p:grpSpPr>
+      <p:sp>
+        <p:nvSpPr>
+          <p:cNvPr id="2" name="Title 1">
+            <a:extLst>
+              <a:ext uri="{FF2B5EF4-FFF2-40B4-BE49-F238E27FC236}">
                 <a16:creationId xmlns:a16="http://schemas.microsoft.com/office/drawing/2014/main" id="{47082C99-04E7-D14F-B844-1CE039178D94}"/>
               </a:ext>
             </a:extLst>
@@ -6852,10 +6950,9 @@
           <a:lstStyle/>
           <a:p>
             <a:r>
-              <a:rPr lang="en-US"/>
-              <a:t>Our research (INCOMPLETE)</a:t>
-            </a:r>
-            <a:endParaRPr lang="en-US" dirty="0"/>
+              <a:rPr lang="en-US" dirty="0"/>
+              <a:t>Our FINDINGS (INCOMPLETE)</a:t>
+            </a:r>
           </a:p>
         </p:txBody>
       </p:sp>
@@ -6926,7 +7023,7 @@
 </p:sld>
 </file>
 
-<file path=ppt/slides/slide7.xml><?xml version="1.0" encoding="utf-8"?>
+<file path=ppt/slides/slide8.xml><?xml version="1.0" encoding="utf-8"?>
 <p:sld xmlns:a="http://schemas.openxmlformats.org/drawingml/2006/main" xmlns:r="http://schemas.openxmlformats.org/officeDocument/2006/relationships" xmlns:p="http://schemas.openxmlformats.org/presentationml/2006/main">
   <p:cSld>
     <p:spTree>

</xml_diff>

<commit_message>
Added bias curves to presentation.
</commit_message>
<xml_diff>
--- a/CIS-700.pptx
+++ b/CIS-700.pptx
@@ -12,7 +12,10 @@
     <p:sldId id="260" r:id="rId6"/>
     <p:sldId id="263" r:id="rId7"/>
     <p:sldId id="261" r:id="rId8"/>
-    <p:sldId id="262" r:id="rId9"/>
+    <p:sldId id="266" r:id="rId9"/>
+    <p:sldId id="264" r:id="rId10"/>
+    <p:sldId id="262" r:id="rId11"/>
+    <p:sldId id="265" r:id="rId12"/>
   </p:sldIdLst>
   <p:sldSz cx="12192000" cy="6858000"/>
   <p:notesSz cx="6858000" cy="9144000"/>
@@ -349,7 +352,7 @@
             <a:fld id="{B61BEF0D-F0BB-DE4B-95CE-6DB70DBA9567}" type="datetimeFigureOut">
               <a:rPr lang="en-US" dirty="0"/>
               <a:pPr/>
-              <a:t>6/6/18</a:t>
+              <a:t>6/11/18</a:t>
             </a:fld>
             <a:endParaRPr lang="en-US" dirty="0"/>
           </a:p>
@@ -680,7 +683,7 @@
             <a:fld id="{B61BEF0D-F0BB-DE4B-95CE-6DB70DBA9567}" type="datetimeFigureOut">
               <a:rPr lang="en-US" dirty="0"/>
               <a:pPr/>
-              <a:t>6/6/18</a:t>
+              <a:t>6/11/18</a:t>
             </a:fld>
             <a:endParaRPr lang="en-US" dirty="0"/>
           </a:p>
@@ -955,7 +958,7 @@
             <a:fld id="{B61BEF0D-F0BB-DE4B-95CE-6DB70DBA9567}" type="datetimeFigureOut">
               <a:rPr lang="en-US" dirty="0"/>
               <a:pPr/>
-              <a:t>6/6/18</a:t>
+              <a:t>6/11/18</a:t>
             </a:fld>
             <a:endParaRPr lang="en-US" dirty="0"/>
           </a:p>
@@ -1520,7 +1523,7 @@
             <a:fld id="{B61BEF0D-F0BB-DE4B-95CE-6DB70DBA9567}" type="datetimeFigureOut">
               <a:rPr lang="en-US" dirty="0"/>
               <a:pPr/>
-              <a:t>6/6/18</a:t>
+              <a:t>6/11/18</a:t>
             </a:fld>
             <a:endParaRPr lang="en-US" dirty="0"/>
           </a:p>
@@ -1795,7 +1798,7 @@
             <a:fld id="{B61BEF0D-F0BB-DE4B-95CE-6DB70DBA9567}" type="datetimeFigureOut">
               <a:rPr lang="en-US" dirty="0"/>
               <a:pPr/>
-              <a:t>6/6/18</a:t>
+              <a:t>6/11/18</a:t>
             </a:fld>
             <a:endParaRPr lang="en-US" dirty="0"/>
           </a:p>
@@ -2354,7 +2357,7 @@
             <a:fld id="{B61BEF0D-F0BB-DE4B-95CE-6DB70DBA9567}" type="datetimeFigureOut">
               <a:rPr lang="en-US" dirty="0"/>
               <a:pPr/>
-              <a:t>6/6/18</a:t>
+              <a:t>6/11/18</a:t>
             </a:fld>
             <a:endParaRPr lang="en-US" dirty="0"/>
           </a:p>
@@ -2678,7 +2681,7 @@
             <a:fld id="{B61BEF0D-F0BB-DE4B-95CE-6DB70DBA9567}" type="datetimeFigureOut">
               <a:rPr lang="en-US" dirty="0"/>
               <a:pPr/>
-              <a:t>6/6/18</a:t>
+              <a:t>6/11/18</a:t>
             </a:fld>
             <a:endParaRPr lang="en-US" dirty="0"/>
           </a:p>
@@ -2852,7 +2855,7 @@
             <a:fld id="{B61BEF0D-F0BB-DE4B-95CE-6DB70DBA9567}" type="datetimeFigureOut">
               <a:rPr lang="en-US" dirty="0"/>
               <a:pPr/>
-              <a:t>6/6/18</a:t>
+              <a:t>6/11/18</a:t>
             </a:fld>
             <a:endParaRPr lang="en-US" dirty="0"/>
           </a:p>
@@ -3087,7 +3090,7 @@
             <a:fld id="{B61BEF0D-F0BB-DE4B-95CE-6DB70DBA9567}" type="datetimeFigureOut">
               <a:rPr lang="en-US" dirty="0"/>
               <a:pPr/>
-              <a:t>6/6/18</a:t>
+              <a:t>6/11/18</a:t>
             </a:fld>
             <a:endParaRPr lang="en-US" dirty="0"/>
           </a:p>
@@ -3284,7 +3287,7 @@
             <a:fld id="{B61BEF0D-F0BB-DE4B-95CE-6DB70DBA9567}" type="datetimeFigureOut">
               <a:rPr lang="en-US" dirty="0"/>
               <a:pPr/>
-              <a:t>6/6/18</a:t>
+              <a:t>6/11/18</a:t>
             </a:fld>
             <a:endParaRPr lang="en-US" dirty="0"/>
           </a:p>
@@ -3557,7 +3560,7 @@
             <a:fld id="{B61BEF0D-F0BB-DE4B-95CE-6DB70DBA9567}" type="datetimeFigureOut">
               <a:rPr lang="en-US" dirty="0"/>
               <a:pPr/>
-              <a:t>6/6/18</a:t>
+              <a:t>6/11/18</a:t>
             </a:fld>
             <a:endParaRPr lang="en-US" dirty="0"/>
           </a:p>
@@ -3820,7 +3823,7 @@
             <a:fld id="{B61BEF0D-F0BB-DE4B-95CE-6DB70DBA9567}" type="datetimeFigureOut">
               <a:rPr lang="en-US" dirty="0"/>
               <a:pPr/>
-              <a:t>6/6/18</a:t>
+              <a:t>6/11/18</a:t>
             </a:fld>
             <a:endParaRPr lang="en-US" dirty="0"/>
           </a:p>
@@ -4191,7 +4194,7 @@
             <a:fld id="{B61BEF0D-F0BB-DE4B-95CE-6DB70DBA9567}" type="datetimeFigureOut">
               <a:rPr lang="en-US" dirty="0"/>
               <a:pPr/>
-              <a:t>6/6/18</a:t>
+              <a:t>6/11/18</a:t>
             </a:fld>
             <a:endParaRPr lang="en-US" dirty="0"/>
           </a:p>
@@ -4336,7 +4339,7 @@
             <a:fld id="{B61BEF0D-F0BB-DE4B-95CE-6DB70DBA9567}" type="datetimeFigureOut">
               <a:rPr lang="en-US" dirty="0"/>
               <a:pPr/>
-              <a:t>6/6/18</a:t>
+              <a:t>6/11/18</a:t>
             </a:fld>
             <a:endParaRPr lang="en-US" dirty="0"/>
           </a:p>
@@ -4458,7 +4461,7 @@
             <a:fld id="{B61BEF0D-F0BB-DE4B-95CE-6DB70DBA9567}" type="datetimeFigureOut">
               <a:rPr lang="en-US" dirty="0"/>
               <a:pPr/>
-              <a:t>6/6/18</a:t>
+              <a:t>6/11/18</a:t>
             </a:fld>
             <a:endParaRPr lang="en-US" dirty="0"/>
           </a:p>
@@ -4740,7 +4743,7 @@
             <a:fld id="{B61BEF0D-F0BB-DE4B-95CE-6DB70DBA9567}" type="datetimeFigureOut">
               <a:rPr lang="en-US" dirty="0"/>
               <a:pPr/>
-              <a:t>6/6/18</a:t>
+              <a:t>6/11/18</a:t>
             </a:fld>
             <a:endParaRPr lang="en-US" dirty="0"/>
           </a:p>
@@ -5061,7 +5064,7 @@
             <a:fld id="{B61BEF0D-F0BB-DE4B-95CE-6DB70DBA9567}" type="datetimeFigureOut">
               <a:rPr lang="en-US" dirty="0"/>
               <a:pPr/>
-              <a:t>6/6/18</a:t>
+              <a:t>6/11/18</a:t>
             </a:fld>
             <a:endParaRPr lang="en-US" dirty="0"/>
           </a:p>
@@ -5272,7 +5275,7 @@
             <a:fld id="{B61BEF0D-F0BB-DE4B-95CE-6DB70DBA9567}" type="datetimeFigureOut">
               <a:rPr lang="en-US" dirty="0"/>
               <a:pPr/>
-              <a:t>6/6/18</a:t>
+              <a:t>6/11/18</a:t>
             </a:fld>
             <a:endParaRPr lang="en-US" dirty="0"/>
           </a:p>
@@ -5943,6 +5946,193 @@
 </p:sld>
 </file>
 
+<file path=ppt/slides/slide10.xml><?xml version="1.0" encoding="utf-8"?>
+<p:sld xmlns:a="http://schemas.openxmlformats.org/drawingml/2006/main" xmlns:r="http://schemas.openxmlformats.org/officeDocument/2006/relationships" xmlns:p="http://schemas.openxmlformats.org/presentationml/2006/main">
+  <p:cSld>
+    <p:spTree>
+      <p:nvGrpSpPr>
+        <p:cNvPr id="1" name=""/>
+        <p:cNvGrpSpPr/>
+        <p:nvPr/>
+      </p:nvGrpSpPr>
+      <p:grpSpPr>
+        <a:xfrm>
+          <a:off x="0" y="0"/>
+          <a:ext cx="0" cy="0"/>
+          <a:chOff x="0" y="0"/>
+          <a:chExt cx="0" cy="0"/>
+        </a:xfrm>
+      </p:grpSpPr>
+      <p:sp>
+        <p:nvSpPr>
+          <p:cNvPr id="2" name="Title 1">
+            <a:extLst>
+              <a:ext uri="{FF2B5EF4-FFF2-40B4-BE49-F238E27FC236}">
+                <a16:creationId xmlns:a16="http://schemas.microsoft.com/office/drawing/2014/main" id="{5325B127-AFF1-A64B-AABA-A8491CAC4D99}"/>
+              </a:ext>
+            </a:extLst>
+          </p:cNvPr>
+          <p:cNvSpPr>
+            <a:spLocks noGrp="1"/>
+          </p:cNvSpPr>
+          <p:nvPr>
+            <p:ph type="title"/>
+          </p:nvPr>
+        </p:nvSpPr>
+        <p:spPr/>
+        <p:txBody>
+          <a:bodyPr/>
+          <a:lstStyle/>
+          <a:p>
+            <a:r>
+              <a:rPr lang="en-US"/>
+              <a:t>FUTURE WORK (INCOMPLETE)</a:t>
+            </a:r>
+          </a:p>
+        </p:txBody>
+      </p:sp>
+      <p:sp>
+        <p:nvSpPr>
+          <p:cNvPr id="3" name="Content Placeholder 2">
+            <a:extLst>
+              <a:ext uri="{FF2B5EF4-FFF2-40B4-BE49-F238E27FC236}">
+                <a16:creationId xmlns:a16="http://schemas.microsoft.com/office/drawing/2014/main" id="{AA79753A-FDC4-A54C-A225-9613367BD217}"/>
+              </a:ext>
+            </a:extLst>
+          </p:cNvPr>
+          <p:cNvSpPr>
+            <a:spLocks noGrp="1"/>
+          </p:cNvSpPr>
+          <p:nvPr>
+            <p:ph idx="1"/>
+          </p:nvPr>
+        </p:nvSpPr>
+        <p:spPr/>
+        <p:txBody>
+          <a:bodyPr/>
+          <a:lstStyle/>
+          <a:p>
+            <a:r>
+              <a:rPr lang="en-US" dirty="0"/>
+              <a:t>Ability to reproduce using iPhone / mobile device?</a:t>
+            </a:r>
+          </a:p>
+          <a:p>
+            <a:endParaRPr lang="en-US" dirty="0"/>
+          </a:p>
+          <a:p>
+            <a:endParaRPr lang="en-US" dirty="0"/>
+          </a:p>
+          <a:p>
+            <a:endParaRPr lang="en-US" dirty="0"/>
+          </a:p>
+          <a:p>
+            <a:r>
+              <a:rPr lang="en-US" dirty="0"/>
+              <a:t>Would the accuracy of classifiers improve with additional feature detection?</a:t>
+            </a:r>
+          </a:p>
+          <a:p>
+            <a:endParaRPr lang="en-US" dirty="0"/>
+          </a:p>
+        </p:txBody>
+      </p:sp>
+    </p:spTree>
+    <p:extLst>
+      <p:ext uri="{BB962C8B-B14F-4D97-AF65-F5344CB8AC3E}">
+        <p14:creationId xmlns:p14="http://schemas.microsoft.com/office/powerpoint/2010/main" val="3349581832"/>
+      </p:ext>
+    </p:extLst>
+  </p:cSld>
+  <p:clrMapOvr>
+    <a:masterClrMapping/>
+  </p:clrMapOvr>
+</p:sld>
+</file>
+
+<file path=ppt/slides/slide11.xml><?xml version="1.0" encoding="utf-8"?>
+<p:sld xmlns:a="http://schemas.openxmlformats.org/drawingml/2006/main" xmlns:r="http://schemas.openxmlformats.org/officeDocument/2006/relationships" xmlns:p="http://schemas.openxmlformats.org/presentationml/2006/main">
+  <p:cSld>
+    <p:spTree>
+      <p:nvGrpSpPr>
+        <p:cNvPr id="1" name=""/>
+        <p:cNvGrpSpPr/>
+        <p:nvPr/>
+      </p:nvGrpSpPr>
+      <p:grpSpPr>
+        <a:xfrm>
+          <a:off x="0" y="0"/>
+          <a:ext cx="0" cy="0"/>
+          <a:chOff x="0" y="0"/>
+          <a:chExt cx="0" cy="0"/>
+        </a:xfrm>
+      </p:grpSpPr>
+      <p:sp>
+        <p:nvSpPr>
+          <p:cNvPr id="2" name="Title 1">
+            <a:extLst>
+              <a:ext uri="{FF2B5EF4-FFF2-40B4-BE49-F238E27FC236}">
+                <a16:creationId xmlns:a16="http://schemas.microsoft.com/office/drawing/2014/main" id="{E210166A-82EC-624F-A122-7AAF29FE057A}"/>
+              </a:ext>
+            </a:extLst>
+          </p:cNvPr>
+          <p:cNvSpPr>
+            <a:spLocks noGrp="1"/>
+          </p:cNvSpPr>
+          <p:nvPr>
+            <p:ph type="title"/>
+          </p:nvPr>
+        </p:nvSpPr>
+        <p:spPr/>
+        <p:txBody>
+          <a:bodyPr/>
+          <a:lstStyle/>
+          <a:p>
+            <a:r>
+              <a:rPr lang="en-US" dirty="0"/>
+              <a:t>References</a:t>
+            </a:r>
+          </a:p>
+        </p:txBody>
+      </p:sp>
+      <p:sp>
+        <p:nvSpPr>
+          <p:cNvPr id="3" name="Content Placeholder 2">
+            <a:extLst>
+              <a:ext uri="{FF2B5EF4-FFF2-40B4-BE49-F238E27FC236}">
+                <a16:creationId xmlns:a16="http://schemas.microsoft.com/office/drawing/2014/main" id="{95E37B6C-99AD-8A48-B1A0-D9CE11748E67}"/>
+              </a:ext>
+            </a:extLst>
+          </p:cNvPr>
+          <p:cNvSpPr>
+            <a:spLocks noGrp="1"/>
+          </p:cNvSpPr>
+          <p:nvPr>
+            <p:ph idx="1"/>
+          </p:nvPr>
+        </p:nvSpPr>
+        <p:spPr/>
+        <p:txBody>
+          <a:bodyPr/>
+          <a:lstStyle/>
+          <a:p>
+            <a:endParaRPr lang="en-US"/>
+          </a:p>
+        </p:txBody>
+      </p:sp>
+    </p:spTree>
+    <p:extLst>
+      <p:ext uri="{BB962C8B-B14F-4D97-AF65-F5344CB8AC3E}">
+        <p14:creationId xmlns:p14="http://schemas.microsoft.com/office/powerpoint/2010/main" val="1974716320"/>
+      </p:ext>
+    </p:extLst>
+  </p:cSld>
+  <p:clrMapOvr>
+    <a:masterClrMapping/>
+  </p:clrMapOvr>
+</p:sld>
+</file>
+
 <file path=ppt/slides/slide2.xml><?xml version="1.0" encoding="utf-8"?>
 <p:sld xmlns:a="http://schemas.openxmlformats.org/drawingml/2006/main" xmlns:r="http://schemas.openxmlformats.org/officeDocument/2006/relationships" xmlns:p="http://schemas.openxmlformats.org/presentationml/2006/main">
   <p:cSld>
@@ -6808,10 +6998,7 @@
           <a:bodyPr/>
           <a:lstStyle/>
           <a:p>
-            <a:r>
-              <a:rPr lang="en-US" dirty="0"/>
-              <a:t>Banknote image &gt; Vector of RGB pixel values &gt;</a:t>
-            </a:r>
+            <a:endParaRPr lang="en-US" dirty="0"/>
           </a:p>
         </p:txBody>
       </p:sp>
@@ -6951,7 +7138,7 @@
           <a:p>
             <a:r>
               <a:rPr lang="en-US" dirty="0"/>
-              <a:t>Our FINDINGS (INCOMPLETE)</a:t>
+              <a:t>Our FINDINGS: COMPARING CLASSIFIER MODELS</a:t>
             </a:r>
           </a:p>
         </p:txBody>
@@ -6991,19 +7178,18 @@
           </a:p>
           <a:p>
             <a:pPr lvl="1"/>
+            <a:endParaRPr lang="en-US" dirty="0"/>
+          </a:p>
+          <a:p>
+            <a:pPr lvl="1"/>
+            <a:endParaRPr lang="en-US" dirty="0"/>
+          </a:p>
+          <a:p>
+            <a:pPr lvl="1"/>
             <a:r>
               <a:rPr lang="en-US" dirty="0"/>
-              <a:t>Finding bias variance curve</a:t>
-            </a:r>
-          </a:p>
-          <a:p>
-            <a:r>
-              <a:rPr lang="en-US" dirty="0"/>
-              <a:t>Boiling Frog attack (and other drifting attacks)</a:t>
-            </a:r>
-          </a:p>
-          <a:p>
-            <a:endParaRPr lang="en-US" dirty="0"/>
+              <a:t>Bias variance curves</a:t>
+            </a:r>
           </a:p>
           <a:p>
             <a:endParaRPr lang="en-US" dirty="0"/>
@@ -7045,7 +7231,7 @@
           <p:cNvPr id="2" name="Title 1">
             <a:extLst>
               <a:ext uri="{FF2B5EF4-FFF2-40B4-BE49-F238E27FC236}">
-                <a16:creationId xmlns:a16="http://schemas.microsoft.com/office/drawing/2014/main" id="{5325B127-AFF1-A64B-AABA-A8491CAC4D99}"/>
+                <a16:creationId xmlns:a16="http://schemas.microsoft.com/office/drawing/2014/main" id="{9051DDFB-452C-F74C-8B06-29462C074661}"/>
               </a:ext>
             </a:extLst>
           </p:cNvPr>
@@ -7062,8 +7248,555 @@
           <a:lstStyle/>
           <a:p>
             <a:r>
-              <a:rPr lang="en-US"/>
-              <a:t>FUTURE WORK (INCOMPLETE)</a:t>
+              <a:rPr lang="en-US" dirty="0"/>
+              <a:t>Bias Variance Curve</a:t>
+            </a:r>
+          </a:p>
+        </p:txBody>
+      </p:sp>
+      <p:pic>
+        <p:nvPicPr>
+          <p:cNvPr id="4" name="Picture 3">
+            <a:extLst>
+              <a:ext uri="{FF2B5EF4-FFF2-40B4-BE49-F238E27FC236}">
+                <a16:creationId xmlns:a16="http://schemas.microsoft.com/office/drawing/2014/main" id="{1917AD77-3673-004F-AA15-71C99DDFA09D}"/>
+              </a:ext>
+            </a:extLst>
+          </p:cNvPr>
+          <p:cNvPicPr>
+            <a:picLocks noChangeAspect="1"/>
+          </p:cNvPicPr>
+          <p:nvPr/>
+        </p:nvPicPr>
+        <p:blipFill>
+          <a:blip r:embed="rId2"/>
+          <a:stretch>
+            <a:fillRect/>
+          </a:stretch>
+        </p:blipFill>
+        <p:spPr>
+          <a:xfrm>
+            <a:off x="1706889" y="3728133"/>
+            <a:ext cx="2836575" cy="2127431"/>
+          </a:xfrm>
+          <a:prstGeom prst="rect">
+            <a:avLst/>
+          </a:prstGeom>
+        </p:spPr>
+      </p:pic>
+      <p:pic>
+        <p:nvPicPr>
+          <p:cNvPr id="5" name="Picture 4">
+            <a:extLst>
+              <a:ext uri="{FF2B5EF4-FFF2-40B4-BE49-F238E27FC236}">
+                <a16:creationId xmlns:a16="http://schemas.microsoft.com/office/drawing/2014/main" id="{BD7FC03F-C886-A147-8EF8-44AE9AAC071C}"/>
+              </a:ext>
+            </a:extLst>
+          </p:cNvPr>
+          <p:cNvPicPr>
+            <a:picLocks noChangeAspect="1"/>
+          </p:cNvPicPr>
+          <p:nvPr/>
+        </p:nvPicPr>
+        <p:blipFill>
+          <a:blip r:embed="rId3"/>
+          <a:stretch>
+            <a:fillRect/>
+          </a:stretch>
+        </p:blipFill>
+        <p:spPr>
+          <a:xfrm>
+            <a:off x="5177129" y="986565"/>
+            <a:ext cx="2864432" cy="2162591"/>
+          </a:xfrm>
+          <a:prstGeom prst="rect">
+            <a:avLst/>
+          </a:prstGeom>
+        </p:spPr>
+      </p:pic>
+      <p:pic>
+        <p:nvPicPr>
+          <p:cNvPr id="6" name="Picture 5">
+            <a:extLst>
+              <a:ext uri="{FF2B5EF4-FFF2-40B4-BE49-F238E27FC236}">
+                <a16:creationId xmlns:a16="http://schemas.microsoft.com/office/drawing/2014/main" id="{22E59AC2-C48F-3A4C-815C-F233B08B1EC0}"/>
+              </a:ext>
+            </a:extLst>
+          </p:cNvPr>
+          <p:cNvPicPr>
+            <a:picLocks noChangeAspect="1"/>
+          </p:cNvPicPr>
+          <p:nvPr/>
+        </p:nvPicPr>
+        <p:blipFill>
+          <a:blip r:embed="rId4"/>
+          <a:stretch>
+            <a:fillRect/>
+          </a:stretch>
+        </p:blipFill>
+        <p:spPr>
+          <a:xfrm>
+            <a:off x="8635775" y="986566"/>
+            <a:ext cx="2883455" cy="2162591"/>
+          </a:xfrm>
+          <a:prstGeom prst="rect">
+            <a:avLst/>
+          </a:prstGeom>
+        </p:spPr>
+      </p:pic>
+      <p:pic>
+        <p:nvPicPr>
+          <p:cNvPr id="7" name="Picture 6">
+            <a:extLst>
+              <a:ext uri="{FF2B5EF4-FFF2-40B4-BE49-F238E27FC236}">
+                <a16:creationId xmlns:a16="http://schemas.microsoft.com/office/drawing/2014/main" id="{0625A1C7-2A38-7E4D-9773-E31659724E4F}"/>
+              </a:ext>
+            </a:extLst>
+          </p:cNvPr>
+          <p:cNvPicPr>
+            <a:picLocks noChangeAspect="1"/>
+          </p:cNvPicPr>
+          <p:nvPr/>
+        </p:nvPicPr>
+        <p:blipFill>
+          <a:blip r:embed="rId5"/>
+          <a:stretch>
+            <a:fillRect/>
+          </a:stretch>
+        </p:blipFill>
+        <p:spPr>
+          <a:xfrm>
+            <a:off x="5137678" y="3728133"/>
+            <a:ext cx="2903883" cy="2127431"/>
+          </a:xfrm>
+          <a:prstGeom prst="rect">
+            <a:avLst/>
+          </a:prstGeom>
+        </p:spPr>
+      </p:pic>
+      <p:pic>
+        <p:nvPicPr>
+          <p:cNvPr id="8" name="Picture 7">
+            <a:extLst>
+              <a:ext uri="{FF2B5EF4-FFF2-40B4-BE49-F238E27FC236}">
+                <a16:creationId xmlns:a16="http://schemas.microsoft.com/office/drawing/2014/main" id="{E2781005-F747-2348-AC8E-C634E7FDC43C}"/>
+              </a:ext>
+            </a:extLst>
+          </p:cNvPr>
+          <p:cNvPicPr>
+            <a:picLocks noChangeAspect="1"/>
+          </p:cNvPicPr>
+          <p:nvPr/>
+        </p:nvPicPr>
+        <p:blipFill>
+          <a:blip r:embed="rId6"/>
+          <a:stretch>
+            <a:fillRect/>
+          </a:stretch>
+        </p:blipFill>
+        <p:spPr>
+          <a:xfrm>
+            <a:off x="8635775" y="3687691"/>
+            <a:ext cx="2890497" cy="2167873"/>
+          </a:xfrm>
+          <a:prstGeom prst="rect">
+            <a:avLst/>
+          </a:prstGeom>
+        </p:spPr>
+      </p:pic>
+      <p:sp>
+        <p:nvSpPr>
+          <p:cNvPr id="9" name="TextBox 8">
+            <a:extLst>
+              <a:ext uri="{FF2B5EF4-FFF2-40B4-BE49-F238E27FC236}">
+                <a16:creationId xmlns:a16="http://schemas.microsoft.com/office/drawing/2014/main" id="{D4C6F7DA-32E2-7448-B0A3-750DB7320E5C}"/>
+              </a:ext>
+            </a:extLst>
+          </p:cNvPr>
+          <p:cNvSpPr txBox="1"/>
+          <p:nvPr/>
+        </p:nvSpPr>
+        <p:spPr>
+          <a:xfrm>
+            <a:off x="2307911" y="5855564"/>
+            <a:ext cx="1567224" cy="369332"/>
+          </a:xfrm>
+          <a:prstGeom prst="rect">
+            <a:avLst/>
+          </a:prstGeom>
+          <a:noFill/>
+        </p:spPr>
+        <p:txBody>
+          <a:bodyPr wrap="none" rtlCol="0">
+            <a:spAutoFit/>
+          </a:bodyPr>
+          <a:lstStyle/>
+          <a:p>
+            <a:r>
+              <a:rPr lang="en-US" dirty="0"/>
+              <a:t>Random forest</a:t>
+            </a:r>
+          </a:p>
+        </p:txBody>
+      </p:sp>
+      <p:sp>
+        <p:nvSpPr>
+          <p:cNvPr id="11" name="TextBox 10">
+            <a:extLst>
+              <a:ext uri="{FF2B5EF4-FFF2-40B4-BE49-F238E27FC236}">
+                <a16:creationId xmlns:a16="http://schemas.microsoft.com/office/drawing/2014/main" id="{9D2B4BC3-AA67-C74E-AC0A-9FF4786C29C6}"/>
+              </a:ext>
+            </a:extLst>
+          </p:cNvPr>
+          <p:cNvSpPr txBox="1"/>
+          <p:nvPr/>
+        </p:nvSpPr>
+        <p:spPr>
+          <a:xfrm>
+            <a:off x="5751513" y="3149156"/>
+            <a:ext cx="1644937" cy="369332"/>
+          </a:xfrm>
+          <a:prstGeom prst="rect">
+            <a:avLst/>
+          </a:prstGeom>
+          <a:noFill/>
+        </p:spPr>
+        <p:txBody>
+          <a:bodyPr wrap="none" rtlCol="0">
+            <a:spAutoFit/>
+          </a:bodyPr>
+          <a:lstStyle/>
+          <a:p>
+            <a:r>
+              <a:rPr lang="en-US" dirty="0"/>
+              <a:t>Neural network</a:t>
+            </a:r>
+          </a:p>
+        </p:txBody>
+      </p:sp>
+      <p:sp>
+        <p:nvSpPr>
+          <p:cNvPr id="12" name="TextBox 11">
+            <a:extLst>
+              <a:ext uri="{FF2B5EF4-FFF2-40B4-BE49-F238E27FC236}">
+                <a16:creationId xmlns:a16="http://schemas.microsoft.com/office/drawing/2014/main" id="{E543AF96-EA75-1F45-B8CE-72C67381F6CB}"/>
+              </a:ext>
+            </a:extLst>
+          </p:cNvPr>
+          <p:cNvSpPr txBox="1"/>
+          <p:nvPr/>
+        </p:nvSpPr>
+        <p:spPr>
+          <a:xfrm>
+            <a:off x="9695826" y="3124842"/>
+            <a:ext cx="763351" cy="369332"/>
+          </a:xfrm>
+          <a:prstGeom prst="rect">
+            <a:avLst/>
+          </a:prstGeom>
+          <a:noFill/>
+        </p:spPr>
+        <p:txBody>
+          <a:bodyPr wrap="none" rtlCol="0">
+            <a:spAutoFit/>
+          </a:bodyPr>
+          <a:lstStyle/>
+          <a:p>
+            <a:r>
+              <a:rPr lang="en-US" dirty="0"/>
+              <a:t>Linear</a:t>
+            </a:r>
+          </a:p>
+        </p:txBody>
+      </p:sp>
+      <p:sp>
+        <p:nvSpPr>
+          <p:cNvPr id="13" name="TextBox 12">
+            <a:extLst>
+              <a:ext uri="{FF2B5EF4-FFF2-40B4-BE49-F238E27FC236}">
+                <a16:creationId xmlns:a16="http://schemas.microsoft.com/office/drawing/2014/main" id="{B9111381-A111-EE4B-9183-A1F19C601733}"/>
+              </a:ext>
+            </a:extLst>
+          </p:cNvPr>
+          <p:cNvSpPr txBox="1"/>
+          <p:nvPr/>
+        </p:nvSpPr>
+        <p:spPr>
+          <a:xfrm>
+            <a:off x="5671125" y="5840436"/>
+            <a:ext cx="2059603" cy="369332"/>
+          </a:xfrm>
+          <a:prstGeom prst="rect">
+            <a:avLst/>
+          </a:prstGeom>
+          <a:noFill/>
+        </p:spPr>
+        <p:txBody>
+          <a:bodyPr wrap="none" rtlCol="0">
+            <a:spAutoFit/>
+          </a:bodyPr>
+          <a:lstStyle/>
+          <a:p>
+            <a:r>
+              <a:rPr lang="en-US" dirty="0"/>
+              <a:t>K-nearest neighbors</a:t>
+            </a:r>
+          </a:p>
+        </p:txBody>
+      </p:sp>
+      <p:sp>
+        <p:nvSpPr>
+          <p:cNvPr id="14" name="TextBox 13">
+            <a:extLst>
+              <a:ext uri="{FF2B5EF4-FFF2-40B4-BE49-F238E27FC236}">
+                <a16:creationId xmlns:a16="http://schemas.microsoft.com/office/drawing/2014/main" id="{476699AD-3F1C-5145-9314-C5BEC721FECC}"/>
+              </a:ext>
+            </a:extLst>
+          </p:cNvPr>
+          <p:cNvSpPr txBox="1"/>
+          <p:nvPr/>
+        </p:nvSpPr>
+        <p:spPr>
+          <a:xfrm>
+            <a:off x="9575964" y="5840325"/>
+            <a:ext cx="1027845" cy="369332"/>
+          </a:xfrm>
+          <a:prstGeom prst="rect">
+            <a:avLst/>
+          </a:prstGeom>
+          <a:noFill/>
+        </p:spPr>
+        <p:txBody>
+          <a:bodyPr wrap="none" rtlCol="0">
+            <a:spAutoFit/>
+          </a:bodyPr>
+          <a:lstStyle/>
+          <a:p>
+            <a:r>
+              <a:rPr lang="en-US" dirty="0"/>
+              <a:t>Gaussian</a:t>
+            </a:r>
+          </a:p>
+        </p:txBody>
+      </p:sp>
+      <p:sp>
+        <p:nvSpPr>
+          <p:cNvPr id="15" name="Triangle 14">
+            <a:extLst>
+              <a:ext uri="{FF2B5EF4-FFF2-40B4-BE49-F238E27FC236}">
+                <a16:creationId xmlns:a16="http://schemas.microsoft.com/office/drawing/2014/main" id="{1F704C72-3A53-A549-B67C-A8C7535DDA65}"/>
+              </a:ext>
+            </a:extLst>
+          </p:cNvPr>
+          <p:cNvSpPr/>
+          <p:nvPr/>
+        </p:nvSpPr>
+        <p:spPr>
+          <a:xfrm>
+            <a:off x="1889090" y="1951335"/>
+            <a:ext cx="251209" cy="216559"/>
+          </a:xfrm>
+          <a:prstGeom prst="triangle">
+            <a:avLst/>
+          </a:prstGeom>
+        </p:spPr>
+        <p:style>
+          <a:lnRef idx="2">
+            <a:schemeClr val="accent4">
+              <a:shade val="50000"/>
+            </a:schemeClr>
+          </a:lnRef>
+          <a:fillRef idx="1">
+            <a:schemeClr val="accent4"/>
+          </a:fillRef>
+          <a:effectRef idx="0">
+            <a:schemeClr val="accent4"/>
+          </a:effectRef>
+          <a:fontRef idx="minor">
+            <a:schemeClr val="lt1"/>
+          </a:fontRef>
+        </p:style>
+        <p:txBody>
+          <a:bodyPr rtlCol="0" anchor="ctr"/>
+          <a:lstStyle/>
+          <a:p>
+            <a:pPr algn="ctr"/>
+            <a:endParaRPr lang="en-US"/>
+          </a:p>
+        </p:txBody>
+      </p:sp>
+      <p:sp>
+        <p:nvSpPr>
+          <p:cNvPr id="16" name="TextBox 15">
+            <a:extLst>
+              <a:ext uri="{FF2B5EF4-FFF2-40B4-BE49-F238E27FC236}">
+                <a16:creationId xmlns:a16="http://schemas.microsoft.com/office/drawing/2014/main" id="{AD4AFD5A-1AA7-714D-BB23-E360C8A60CEB}"/>
+              </a:ext>
+            </a:extLst>
+          </p:cNvPr>
+          <p:cNvSpPr txBox="1"/>
+          <p:nvPr/>
+        </p:nvSpPr>
+        <p:spPr>
+          <a:xfrm>
+            <a:off x="2140299" y="1883194"/>
+            <a:ext cx="1260858" cy="369332"/>
+          </a:xfrm>
+          <a:prstGeom prst="rect">
+            <a:avLst/>
+          </a:prstGeom>
+          <a:noFill/>
+        </p:spPr>
+        <p:txBody>
+          <a:bodyPr wrap="none" rtlCol="0">
+            <a:spAutoFit/>
+          </a:bodyPr>
+          <a:lstStyle/>
+          <a:p>
+            <a:r>
+              <a:rPr lang="en-US" dirty="0"/>
+              <a:t>Training set</a:t>
+            </a:r>
+          </a:p>
+        </p:txBody>
+      </p:sp>
+      <p:sp>
+        <p:nvSpPr>
+          <p:cNvPr id="17" name="Oval 16">
+            <a:extLst>
+              <a:ext uri="{FF2B5EF4-FFF2-40B4-BE49-F238E27FC236}">
+                <a16:creationId xmlns:a16="http://schemas.microsoft.com/office/drawing/2014/main" id="{5E767268-105F-5945-9B76-73027EB5397B}"/>
+              </a:ext>
+            </a:extLst>
+          </p:cNvPr>
+          <p:cNvSpPr/>
+          <p:nvPr/>
+        </p:nvSpPr>
+        <p:spPr>
+          <a:xfrm>
+            <a:off x="1868993" y="2461810"/>
+            <a:ext cx="291402" cy="291402"/>
+          </a:xfrm>
+          <a:prstGeom prst="ellipse">
+            <a:avLst/>
+          </a:prstGeom>
+        </p:spPr>
+        <p:style>
+          <a:lnRef idx="2">
+            <a:schemeClr val="accent6">
+              <a:shade val="50000"/>
+            </a:schemeClr>
+          </a:lnRef>
+          <a:fillRef idx="1">
+            <a:schemeClr val="accent6"/>
+          </a:fillRef>
+          <a:effectRef idx="0">
+            <a:schemeClr val="accent6"/>
+          </a:effectRef>
+          <a:fontRef idx="minor">
+            <a:schemeClr val="lt1"/>
+          </a:fontRef>
+        </p:style>
+        <p:txBody>
+          <a:bodyPr rtlCol="0" anchor="ctr"/>
+          <a:lstStyle/>
+          <a:p>
+            <a:pPr algn="ctr"/>
+            <a:endParaRPr lang="en-US"/>
+          </a:p>
+        </p:txBody>
+      </p:sp>
+      <p:sp>
+        <p:nvSpPr>
+          <p:cNvPr id="18" name="TextBox 17">
+            <a:extLst>
+              <a:ext uri="{FF2B5EF4-FFF2-40B4-BE49-F238E27FC236}">
+                <a16:creationId xmlns:a16="http://schemas.microsoft.com/office/drawing/2014/main" id="{AF6D9222-4133-1649-A269-4467046F09E5}"/>
+              </a:ext>
+            </a:extLst>
+          </p:cNvPr>
+          <p:cNvSpPr txBox="1"/>
+          <p:nvPr/>
+        </p:nvSpPr>
+        <p:spPr>
+          <a:xfrm>
+            <a:off x="2160395" y="2383880"/>
+            <a:ext cx="889731" cy="369332"/>
+          </a:xfrm>
+          <a:prstGeom prst="rect">
+            <a:avLst/>
+          </a:prstGeom>
+          <a:noFill/>
+        </p:spPr>
+        <p:txBody>
+          <a:bodyPr wrap="none" rtlCol="0">
+            <a:spAutoFit/>
+          </a:bodyPr>
+          <a:lstStyle/>
+          <a:p>
+            <a:r>
+              <a:rPr lang="en-US" dirty="0"/>
+              <a:t>Test set</a:t>
+            </a:r>
+          </a:p>
+        </p:txBody>
+      </p:sp>
+    </p:spTree>
+    <p:extLst>
+      <p:ext uri="{BB962C8B-B14F-4D97-AF65-F5344CB8AC3E}">
+        <p14:creationId xmlns:p14="http://schemas.microsoft.com/office/powerpoint/2010/main" val="744560585"/>
+      </p:ext>
+    </p:extLst>
+  </p:cSld>
+  <p:clrMapOvr>
+    <a:masterClrMapping/>
+  </p:clrMapOvr>
+</p:sld>
+</file>
+
+<file path=ppt/slides/slide9.xml><?xml version="1.0" encoding="utf-8"?>
+<p:sld xmlns:a="http://schemas.openxmlformats.org/drawingml/2006/main" xmlns:r="http://schemas.openxmlformats.org/officeDocument/2006/relationships" xmlns:p="http://schemas.openxmlformats.org/presentationml/2006/main">
+  <p:cSld>
+    <p:spTree>
+      <p:nvGrpSpPr>
+        <p:cNvPr id="1" name=""/>
+        <p:cNvGrpSpPr/>
+        <p:nvPr/>
+      </p:nvGrpSpPr>
+      <p:grpSpPr>
+        <a:xfrm>
+          <a:off x="0" y="0"/>
+          <a:ext cx="0" cy="0"/>
+          <a:chOff x="0" y="0"/>
+          <a:chExt cx="0" cy="0"/>
+        </a:xfrm>
+      </p:grpSpPr>
+      <p:sp>
+        <p:nvSpPr>
+          <p:cNvPr id="2" name="Title 1">
+            <a:extLst>
+              <a:ext uri="{FF2B5EF4-FFF2-40B4-BE49-F238E27FC236}">
+                <a16:creationId xmlns:a16="http://schemas.microsoft.com/office/drawing/2014/main" id="{91C0562F-E7B8-DB4C-9875-B61EBCB2D979}"/>
+              </a:ext>
+            </a:extLst>
+          </p:cNvPr>
+          <p:cNvSpPr>
+            <a:spLocks noGrp="1"/>
+          </p:cNvSpPr>
+          <p:nvPr>
+            <p:ph type="title"/>
+          </p:nvPr>
+        </p:nvSpPr>
+        <p:spPr/>
+        <p:txBody>
+          <a:bodyPr>
+            <a:normAutofit/>
+          </a:bodyPr>
+          <a:lstStyle/>
+          <a:p>
+            <a:r>
+              <a:rPr lang="en-US" dirty="0"/>
+              <a:t>Boiling Frog attack</a:t>
             </a:r>
           </a:p>
         </p:txBody>
@@ -7073,7 +7806,7 @@
           <p:cNvPr id="3" name="Content Placeholder 2">
             <a:extLst>
               <a:ext uri="{FF2B5EF4-FFF2-40B4-BE49-F238E27FC236}">
-                <a16:creationId xmlns:a16="http://schemas.microsoft.com/office/drawing/2014/main" id="{AA79753A-FDC4-A54C-A225-9613367BD217}"/>
+                <a16:creationId xmlns:a16="http://schemas.microsoft.com/office/drawing/2014/main" id="{65FFF0A8-BEA6-FC4E-8D64-7572F4A9431D}"/>
               </a:ext>
             </a:extLst>
           </p:cNvPr>
@@ -7089,14 +7822,14 @@
           <a:bodyPr/>
           <a:lstStyle/>
           <a:p>
-            <a:endParaRPr lang="en-US"/>
+            <a:endParaRPr lang="en-US" dirty="0"/>
           </a:p>
         </p:txBody>
       </p:sp>
     </p:spTree>
     <p:extLst>
       <p:ext uri="{BB962C8B-B14F-4D97-AF65-F5344CB8AC3E}">
-        <p14:creationId xmlns:p14="http://schemas.microsoft.com/office/powerpoint/2010/main" val="3349581832"/>
+        <p14:creationId xmlns:p14="http://schemas.microsoft.com/office/powerpoint/2010/main" val="2046097373"/>
       </p:ext>
     </p:extLst>
   </p:cSld>

</xml_diff>

<commit_message>
Adding the FBA slides
</commit_message>
<xml_diff>
--- a/CIS-700.pptx
+++ b/CIS-700.pptx
@@ -4,6 +4,9 @@
   <p:sldMasterIdLst>
     <p:sldMasterId id="2147483648" r:id="rId1"/>
   </p:sldMasterIdLst>
+  <p:notesMasterIdLst>
+    <p:notesMasterId r:id="rId17"/>
+  </p:notesMasterIdLst>
   <p:sldIdLst>
     <p:sldId id="256" r:id="rId2"/>
     <p:sldId id="258" r:id="rId3"/>
@@ -14,8 +17,12 @@
     <p:sldId id="261" r:id="rId8"/>
     <p:sldId id="266" r:id="rId9"/>
     <p:sldId id="264" r:id="rId10"/>
-    <p:sldId id="262" r:id="rId11"/>
-    <p:sldId id="265" r:id="rId12"/>
+    <p:sldId id="267" r:id="rId11"/>
+    <p:sldId id="268" r:id="rId12"/>
+    <p:sldId id="269" r:id="rId13"/>
+    <p:sldId id="270" r:id="rId14"/>
+    <p:sldId id="262" r:id="rId15"/>
+    <p:sldId id="265" r:id="rId16"/>
   </p:sldIdLst>
   <p:sldSz cx="12192000" cy="6858000"/>
   <p:notesSz cx="6858000" cy="9144000"/>
@@ -122,6 +129,2103 @@
 </p:presentation>
 </file>
 
+<file path=ppt/revisionInfo.xml><?xml version="1.0" encoding="utf-8"?>
+<p1510:revInfo xmlns:a="http://schemas.openxmlformats.org/drawingml/2006/main" xmlns:r="http://schemas.openxmlformats.org/officeDocument/2006/relationships" xmlns:p1510="http://schemas.microsoft.com/office/powerpoint/2015/10/main"/>
+</file>
+
+<file path=ppt/charts/chart1.xml><?xml version="1.0" encoding="utf-8"?>
+<c:chartSpace xmlns:c="http://schemas.openxmlformats.org/drawingml/2006/chart" xmlns:a="http://schemas.openxmlformats.org/drawingml/2006/main" xmlns:r="http://schemas.openxmlformats.org/officeDocument/2006/relationships" xmlns:c16r2="http://schemas.microsoft.com/office/drawing/2015/06/chart">
+  <c:date1904 val="0"/>
+  <c:lang val="en-US"/>
+  <c:roundedCorners val="0"/>
+  <mc:AlternateContent xmlns:mc="http://schemas.openxmlformats.org/markup-compatibility/2006">
+    <mc:Choice xmlns:c14="http://schemas.microsoft.com/office/drawing/2007/8/2/chart" Requires="c14">
+      <c14:style val="102"/>
+    </mc:Choice>
+    <mc:Fallback>
+      <c:style val="2"/>
+    </mc:Fallback>
+  </mc:AlternateContent>
+  <c:chart>
+    <c:autoTitleDeleted val="1"/>
+    <c:plotArea>
+      <c:layout/>
+      <c:lineChart>
+        <c:grouping val="standard"/>
+        <c:varyColors val="0"/>
+        <c:ser>
+          <c:idx val="0"/>
+          <c:order val="0"/>
+          <c:tx>
+            <c:strRef>
+              <c:f>Sheet1!$B$1</c:f>
+              <c:strCache>
+                <c:ptCount val="1"/>
+                <c:pt idx="0">
+                  <c:v>Linear SVC</c:v>
+                </c:pt>
+              </c:strCache>
+            </c:strRef>
+          </c:tx>
+          <c:spPr>
+            <a:ln w="22225" cap="rnd">
+              <a:solidFill>
+                <a:schemeClr val="accent1"/>
+              </a:solidFill>
+            </a:ln>
+            <a:effectLst>
+              <a:glow rad="139700">
+                <a:schemeClr val="accent1">
+                  <a:satMod val="175000"/>
+                  <a:alpha val="14000"/>
+                </a:schemeClr>
+              </a:glow>
+            </a:effectLst>
+          </c:spPr>
+          <c:marker>
+            <c:symbol val="none"/>
+          </c:marker>
+          <c:dLbls>
+            <c:spPr>
+              <a:noFill/>
+              <a:ln>
+                <a:noFill/>
+              </a:ln>
+              <a:effectLst/>
+            </c:spPr>
+            <c:txPr>
+              <a:bodyPr rot="0" spcFirstLastPara="1" vertOverflow="ellipsis" vert="horz" wrap="square" lIns="38100" tIns="19050" rIns="38100" bIns="19050" anchor="ctr" anchorCtr="1">
+                <a:spAutoFit/>
+              </a:bodyPr>
+              <a:lstStyle/>
+              <a:p>
+                <a:pPr>
+                  <a:defRPr sz="1197" b="0" i="0" u="none" strike="noStrike" kern="1200" baseline="0">
+                    <a:solidFill>
+                      <a:schemeClr val="lt1">
+                        <a:lumMod val="75000"/>
+                      </a:schemeClr>
+                    </a:solidFill>
+                    <a:latin typeface="+mn-lt"/>
+                    <a:ea typeface="+mn-ea"/>
+                    <a:cs typeface="+mn-cs"/>
+                  </a:defRPr>
+                </a:pPr>
+                <a:endParaRPr lang="en-US"/>
+              </a:p>
+            </c:txPr>
+            <c:dLblPos val="ctr"/>
+            <c:showLegendKey val="0"/>
+            <c:showVal val="1"/>
+            <c:showCatName val="0"/>
+            <c:showSerName val="0"/>
+            <c:showPercent val="0"/>
+            <c:showBubbleSize val="0"/>
+            <c:showLeaderLines val="0"/>
+            <c:extLst>
+              <c:ext xmlns:c15="http://schemas.microsoft.com/office/drawing/2012/chart" uri="{CE6537A1-D6FC-4f65-9D91-7224C49458BB}">
+                <c15:showLeaderLines val="1"/>
+                <c15:leaderLines>
+                  <c:spPr>
+                    <a:ln w="9525">
+                      <a:solidFill>
+                        <a:schemeClr val="lt1">
+                          <a:lumMod val="50000"/>
+                        </a:schemeClr>
+                      </a:solidFill>
+                      <a:round/>
+                    </a:ln>
+                    <a:effectLst/>
+                  </c:spPr>
+                </c15:leaderLines>
+              </c:ext>
+            </c:extLst>
+          </c:dLbls>
+          <c:cat>
+            <c:numRef>
+              <c:f>Sheet1!$A$2:$A$6</c:f>
+              <c:numCache>
+                <c:formatCode>General</c:formatCode>
+                <c:ptCount val="5"/>
+                <c:pt idx="0">
+                  <c:v>0</c:v>
+                </c:pt>
+                <c:pt idx="1">
+                  <c:v>50</c:v>
+                </c:pt>
+                <c:pt idx="2">
+                  <c:v>100</c:v>
+                </c:pt>
+                <c:pt idx="3">
+                  <c:v>200</c:v>
+                </c:pt>
+                <c:pt idx="4">
+                  <c:v>500</c:v>
+                </c:pt>
+              </c:numCache>
+            </c:numRef>
+          </c:cat>
+          <c:val>
+            <c:numRef>
+              <c:f>Sheet1!$B$2:$B$6</c:f>
+              <c:numCache>
+                <c:formatCode>0.00%</c:formatCode>
+                <c:ptCount val="5"/>
+                <c:pt idx="0">
+                  <c:v>0.98550000000000004</c:v>
+                </c:pt>
+                <c:pt idx="1">
+                  <c:v>0.98180000000000001</c:v>
+                </c:pt>
+                <c:pt idx="2">
+                  <c:v>0.97450000000000003</c:v>
+                </c:pt>
+                <c:pt idx="3">
+                  <c:v>0.97450000000000003</c:v>
+                </c:pt>
+                <c:pt idx="4">
+                  <c:v>0.96730000000000005</c:v>
+                </c:pt>
+              </c:numCache>
+            </c:numRef>
+          </c:val>
+          <c:smooth val="0"/>
+          <c:extLst>
+            <c:ext xmlns:c16="http://schemas.microsoft.com/office/drawing/2014/chart" uri="{C3380CC4-5D6E-409C-BE32-E72D297353CC}">
+              <c16:uniqueId val="{00000000-7120-4733-82B4-3D26BBCBB52B}"/>
+            </c:ext>
+          </c:extLst>
+        </c:ser>
+        <c:ser>
+          <c:idx val="1"/>
+          <c:order val="1"/>
+          <c:tx>
+            <c:strRef>
+              <c:f>Sheet1!$C$1</c:f>
+              <c:strCache>
+                <c:ptCount val="1"/>
+                <c:pt idx="0">
+                  <c:v>Neural Network</c:v>
+                </c:pt>
+              </c:strCache>
+            </c:strRef>
+          </c:tx>
+          <c:spPr>
+            <a:ln w="22225" cap="rnd">
+              <a:solidFill>
+                <a:schemeClr val="accent2"/>
+              </a:solidFill>
+            </a:ln>
+            <a:effectLst>
+              <a:glow rad="139700">
+                <a:schemeClr val="accent2">
+                  <a:satMod val="175000"/>
+                  <a:alpha val="14000"/>
+                </a:schemeClr>
+              </a:glow>
+            </a:effectLst>
+          </c:spPr>
+          <c:marker>
+            <c:symbol val="none"/>
+          </c:marker>
+          <c:dLbls>
+            <c:spPr>
+              <a:noFill/>
+              <a:ln>
+                <a:noFill/>
+              </a:ln>
+              <a:effectLst/>
+            </c:spPr>
+            <c:txPr>
+              <a:bodyPr rot="0" spcFirstLastPara="1" vertOverflow="ellipsis" vert="horz" wrap="square" lIns="38100" tIns="19050" rIns="38100" bIns="19050" anchor="ctr" anchorCtr="1">
+                <a:spAutoFit/>
+              </a:bodyPr>
+              <a:lstStyle/>
+              <a:p>
+                <a:pPr>
+                  <a:defRPr sz="1197" b="0" i="0" u="none" strike="noStrike" kern="1200" baseline="0">
+                    <a:solidFill>
+                      <a:schemeClr val="lt1">
+                        <a:lumMod val="75000"/>
+                      </a:schemeClr>
+                    </a:solidFill>
+                    <a:latin typeface="+mn-lt"/>
+                    <a:ea typeface="+mn-ea"/>
+                    <a:cs typeface="+mn-cs"/>
+                  </a:defRPr>
+                </a:pPr>
+                <a:endParaRPr lang="en-US"/>
+              </a:p>
+            </c:txPr>
+            <c:dLblPos val="ctr"/>
+            <c:showLegendKey val="0"/>
+            <c:showVal val="1"/>
+            <c:showCatName val="0"/>
+            <c:showSerName val="0"/>
+            <c:showPercent val="0"/>
+            <c:showBubbleSize val="0"/>
+            <c:showLeaderLines val="0"/>
+            <c:extLst>
+              <c:ext xmlns:c15="http://schemas.microsoft.com/office/drawing/2012/chart" uri="{CE6537A1-D6FC-4f65-9D91-7224C49458BB}">
+                <c15:showLeaderLines val="1"/>
+                <c15:leaderLines>
+                  <c:spPr>
+                    <a:ln w="9525">
+                      <a:solidFill>
+                        <a:schemeClr val="lt1">
+                          <a:lumMod val="50000"/>
+                        </a:schemeClr>
+                      </a:solidFill>
+                      <a:round/>
+                    </a:ln>
+                    <a:effectLst/>
+                  </c:spPr>
+                </c15:leaderLines>
+              </c:ext>
+            </c:extLst>
+          </c:dLbls>
+          <c:cat>
+            <c:numRef>
+              <c:f>Sheet1!$A$2:$A$6</c:f>
+              <c:numCache>
+                <c:formatCode>General</c:formatCode>
+                <c:ptCount val="5"/>
+                <c:pt idx="0">
+                  <c:v>0</c:v>
+                </c:pt>
+                <c:pt idx="1">
+                  <c:v>50</c:v>
+                </c:pt>
+                <c:pt idx="2">
+                  <c:v>100</c:v>
+                </c:pt>
+                <c:pt idx="3">
+                  <c:v>200</c:v>
+                </c:pt>
+                <c:pt idx="4">
+                  <c:v>500</c:v>
+                </c:pt>
+              </c:numCache>
+            </c:numRef>
+          </c:cat>
+          <c:val>
+            <c:numRef>
+              <c:f>Sheet1!$C$2:$C$6</c:f>
+              <c:numCache>
+                <c:formatCode>0%</c:formatCode>
+                <c:ptCount val="5"/>
+                <c:pt idx="0">
+                  <c:v>1</c:v>
+                </c:pt>
+                <c:pt idx="1">
+                  <c:v>1</c:v>
+                </c:pt>
+                <c:pt idx="2" formatCode="0.00%">
+                  <c:v>0.99639999999999995</c:v>
+                </c:pt>
+                <c:pt idx="3" formatCode="0.00%">
+                  <c:v>0.99639999999999995</c:v>
+                </c:pt>
+                <c:pt idx="4" formatCode="0.00%">
+                  <c:v>0.99639999999999995</c:v>
+                </c:pt>
+              </c:numCache>
+            </c:numRef>
+          </c:val>
+          <c:smooth val="0"/>
+          <c:extLst>
+            <c:ext xmlns:c16="http://schemas.microsoft.com/office/drawing/2014/chart" uri="{C3380CC4-5D6E-409C-BE32-E72D297353CC}">
+              <c16:uniqueId val="{00000001-7120-4733-82B4-3D26BBCBB52B}"/>
+            </c:ext>
+          </c:extLst>
+        </c:ser>
+        <c:ser>
+          <c:idx val="2"/>
+          <c:order val="2"/>
+          <c:tx>
+            <c:strRef>
+              <c:f>Sheet1!$D$1</c:f>
+              <c:strCache>
+                <c:ptCount val="1"/>
+                <c:pt idx="0">
+                  <c:v>Gaussian</c:v>
+                </c:pt>
+              </c:strCache>
+            </c:strRef>
+          </c:tx>
+          <c:spPr>
+            <a:ln w="22225" cap="rnd">
+              <a:solidFill>
+                <a:schemeClr val="accent3"/>
+              </a:solidFill>
+            </a:ln>
+            <a:effectLst>
+              <a:glow rad="139700">
+                <a:schemeClr val="accent3">
+                  <a:satMod val="175000"/>
+                  <a:alpha val="14000"/>
+                </a:schemeClr>
+              </a:glow>
+            </a:effectLst>
+          </c:spPr>
+          <c:marker>
+            <c:symbol val="none"/>
+          </c:marker>
+          <c:dLbls>
+            <c:spPr>
+              <a:noFill/>
+              <a:ln>
+                <a:noFill/>
+              </a:ln>
+              <a:effectLst/>
+            </c:spPr>
+            <c:txPr>
+              <a:bodyPr rot="0" spcFirstLastPara="1" vertOverflow="ellipsis" vert="horz" wrap="square" lIns="38100" tIns="19050" rIns="38100" bIns="19050" anchor="ctr" anchorCtr="1">
+                <a:spAutoFit/>
+              </a:bodyPr>
+              <a:lstStyle/>
+              <a:p>
+                <a:pPr>
+                  <a:defRPr sz="1197" b="0" i="0" u="none" strike="noStrike" kern="1200" baseline="0">
+                    <a:solidFill>
+                      <a:schemeClr val="lt1">
+                        <a:lumMod val="75000"/>
+                      </a:schemeClr>
+                    </a:solidFill>
+                    <a:latin typeface="+mn-lt"/>
+                    <a:ea typeface="+mn-ea"/>
+                    <a:cs typeface="+mn-cs"/>
+                  </a:defRPr>
+                </a:pPr>
+                <a:endParaRPr lang="en-US"/>
+              </a:p>
+            </c:txPr>
+            <c:dLblPos val="ctr"/>
+            <c:showLegendKey val="0"/>
+            <c:showVal val="1"/>
+            <c:showCatName val="0"/>
+            <c:showSerName val="0"/>
+            <c:showPercent val="0"/>
+            <c:showBubbleSize val="0"/>
+            <c:showLeaderLines val="0"/>
+            <c:extLst>
+              <c:ext xmlns:c15="http://schemas.microsoft.com/office/drawing/2012/chart" uri="{CE6537A1-D6FC-4f65-9D91-7224C49458BB}">
+                <c15:showLeaderLines val="1"/>
+                <c15:leaderLines>
+                  <c:spPr>
+                    <a:ln w="9525">
+                      <a:solidFill>
+                        <a:schemeClr val="lt1">
+                          <a:lumMod val="50000"/>
+                        </a:schemeClr>
+                      </a:solidFill>
+                      <a:round/>
+                    </a:ln>
+                    <a:effectLst/>
+                  </c:spPr>
+                </c15:leaderLines>
+              </c:ext>
+            </c:extLst>
+          </c:dLbls>
+          <c:cat>
+            <c:numRef>
+              <c:f>Sheet1!$A$2:$A$6</c:f>
+              <c:numCache>
+                <c:formatCode>General</c:formatCode>
+                <c:ptCount val="5"/>
+                <c:pt idx="0">
+                  <c:v>0</c:v>
+                </c:pt>
+                <c:pt idx="1">
+                  <c:v>50</c:v>
+                </c:pt>
+                <c:pt idx="2">
+                  <c:v>100</c:v>
+                </c:pt>
+                <c:pt idx="3">
+                  <c:v>200</c:v>
+                </c:pt>
+                <c:pt idx="4">
+                  <c:v>500</c:v>
+                </c:pt>
+              </c:numCache>
+            </c:numRef>
+          </c:cat>
+          <c:val>
+            <c:numRef>
+              <c:f>Sheet1!$D$2:$D$6</c:f>
+              <c:numCache>
+                <c:formatCode>0.00%</c:formatCode>
+                <c:ptCount val="5"/>
+                <c:pt idx="0">
+                  <c:v>0.99270000000000003</c:v>
+                </c:pt>
+                <c:pt idx="1">
+                  <c:v>0.99270000000000003</c:v>
+                </c:pt>
+                <c:pt idx="2">
+                  <c:v>0.98180000000000001</c:v>
+                </c:pt>
+                <c:pt idx="3">
+                  <c:v>0.97819999999999996</c:v>
+                </c:pt>
+                <c:pt idx="4">
+                  <c:v>0.97089999999999999</c:v>
+                </c:pt>
+              </c:numCache>
+            </c:numRef>
+          </c:val>
+          <c:smooth val="0"/>
+          <c:extLst>
+            <c:ext xmlns:c16="http://schemas.microsoft.com/office/drawing/2014/chart" uri="{C3380CC4-5D6E-409C-BE32-E72D297353CC}">
+              <c16:uniqueId val="{00000002-7120-4733-82B4-3D26BBCBB52B}"/>
+            </c:ext>
+          </c:extLst>
+        </c:ser>
+        <c:ser>
+          <c:idx val="3"/>
+          <c:order val="3"/>
+          <c:tx>
+            <c:strRef>
+              <c:f>Sheet1!$E$1</c:f>
+              <c:strCache>
+                <c:ptCount val="1"/>
+                <c:pt idx="0">
+                  <c:v>KNN</c:v>
+                </c:pt>
+              </c:strCache>
+            </c:strRef>
+          </c:tx>
+          <c:spPr>
+            <a:ln w="22225" cap="rnd">
+              <a:solidFill>
+                <a:schemeClr val="accent4"/>
+              </a:solidFill>
+            </a:ln>
+            <a:effectLst>
+              <a:glow rad="139700">
+                <a:schemeClr val="accent4">
+                  <a:satMod val="175000"/>
+                  <a:alpha val="14000"/>
+                </a:schemeClr>
+              </a:glow>
+            </a:effectLst>
+          </c:spPr>
+          <c:marker>
+            <c:symbol val="none"/>
+          </c:marker>
+          <c:dLbls>
+            <c:spPr>
+              <a:noFill/>
+              <a:ln>
+                <a:noFill/>
+              </a:ln>
+              <a:effectLst/>
+            </c:spPr>
+            <c:txPr>
+              <a:bodyPr rot="0" spcFirstLastPara="1" vertOverflow="ellipsis" vert="horz" wrap="square" lIns="38100" tIns="19050" rIns="38100" bIns="19050" anchor="ctr" anchorCtr="1">
+                <a:spAutoFit/>
+              </a:bodyPr>
+              <a:lstStyle/>
+              <a:p>
+                <a:pPr>
+                  <a:defRPr sz="1197" b="0" i="0" u="none" strike="noStrike" kern="1200" baseline="0">
+                    <a:solidFill>
+                      <a:schemeClr val="lt1">
+                        <a:lumMod val="75000"/>
+                      </a:schemeClr>
+                    </a:solidFill>
+                    <a:latin typeface="+mn-lt"/>
+                    <a:ea typeface="+mn-ea"/>
+                    <a:cs typeface="+mn-cs"/>
+                  </a:defRPr>
+                </a:pPr>
+                <a:endParaRPr lang="en-US"/>
+              </a:p>
+            </c:txPr>
+            <c:dLblPos val="ctr"/>
+            <c:showLegendKey val="0"/>
+            <c:showVal val="1"/>
+            <c:showCatName val="0"/>
+            <c:showSerName val="0"/>
+            <c:showPercent val="0"/>
+            <c:showBubbleSize val="0"/>
+            <c:showLeaderLines val="0"/>
+            <c:extLst>
+              <c:ext xmlns:c15="http://schemas.microsoft.com/office/drawing/2012/chart" uri="{CE6537A1-D6FC-4f65-9D91-7224C49458BB}">
+                <c15:showLeaderLines val="1"/>
+                <c15:leaderLines>
+                  <c:spPr>
+                    <a:ln w="9525">
+                      <a:solidFill>
+                        <a:schemeClr val="lt1">
+                          <a:lumMod val="50000"/>
+                        </a:schemeClr>
+                      </a:solidFill>
+                      <a:round/>
+                    </a:ln>
+                    <a:effectLst/>
+                  </c:spPr>
+                </c15:leaderLines>
+              </c:ext>
+            </c:extLst>
+          </c:dLbls>
+          <c:cat>
+            <c:numRef>
+              <c:f>Sheet1!$A$2:$A$6</c:f>
+              <c:numCache>
+                <c:formatCode>General</c:formatCode>
+                <c:ptCount val="5"/>
+                <c:pt idx="0">
+                  <c:v>0</c:v>
+                </c:pt>
+                <c:pt idx="1">
+                  <c:v>50</c:v>
+                </c:pt>
+                <c:pt idx="2">
+                  <c:v>100</c:v>
+                </c:pt>
+                <c:pt idx="3">
+                  <c:v>200</c:v>
+                </c:pt>
+                <c:pt idx="4">
+                  <c:v>500</c:v>
+                </c:pt>
+              </c:numCache>
+            </c:numRef>
+          </c:cat>
+          <c:val>
+            <c:numRef>
+              <c:f>Sheet1!$E$2:$E$6</c:f>
+              <c:numCache>
+                <c:formatCode>0.00%</c:formatCode>
+                <c:ptCount val="5"/>
+                <c:pt idx="0" formatCode="0%">
+                  <c:v>1</c:v>
+                </c:pt>
+                <c:pt idx="1">
+                  <c:v>0.99639999999999995</c:v>
+                </c:pt>
+                <c:pt idx="2">
+                  <c:v>0.99639999999999995</c:v>
+                </c:pt>
+                <c:pt idx="3">
+                  <c:v>0.99639999999999995</c:v>
+                </c:pt>
+                <c:pt idx="4">
+                  <c:v>0.99639999999999995</c:v>
+                </c:pt>
+              </c:numCache>
+            </c:numRef>
+          </c:val>
+          <c:smooth val="0"/>
+          <c:extLst>
+            <c:ext xmlns:c16="http://schemas.microsoft.com/office/drawing/2014/chart" uri="{C3380CC4-5D6E-409C-BE32-E72D297353CC}">
+              <c16:uniqueId val="{00000003-7120-4733-82B4-3D26BBCBB52B}"/>
+            </c:ext>
+          </c:extLst>
+        </c:ser>
+        <c:ser>
+          <c:idx val="4"/>
+          <c:order val="4"/>
+          <c:tx>
+            <c:strRef>
+              <c:f>Sheet1!$F$1</c:f>
+              <c:strCache>
+                <c:ptCount val="1"/>
+                <c:pt idx="0">
+                  <c:v>Random Forest</c:v>
+                </c:pt>
+              </c:strCache>
+            </c:strRef>
+          </c:tx>
+          <c:spPr>
+            <a:ln w="22225" cap="rnd">
+              <a:solidFill>
+                <a:schemeClr val="accent5"/>
+              </a:solidFill>
+            </a:ln>
+            <a:effectLst>
+              <a:glow rad="139700">
+                <a:schemeClr val="accent5">
+                  <a:satMod val="175000"/>
+                  <a:alpha val="14000"/>
+                </a:schemeClr>
+              </a:glow>
+            </a:effectLst>
+          </c:spPr>
+          <c:marker>
+            <c:symbol val="none"/>
+          </c:marker>
+          <c:dLbls>
+            <c:spPr>
+              <a:noFill/>
+              <a:ln>
+                <a:noFill/>
+              </a:ln>
+              <a:effectLst/>
+            </c:spPr>
+            <c:txPr>
+              <a:bodyPr rot="0" spcFirstLastPara="1" vertOverflow="ellipsis" vert="horz" wrap="square" lIns="38100" tIns="19050" rIns="38100" bIns="19050" anchor="ctr" anchorCtr="1">
+                <a:spAutoFit/>
+              </a:bodyPr>
+              <a:lstStyle/>
+              <a:p>
+                <a:pPr>
+                  <a:defRPr sz="1197" b="0" i="0" u="none" strike="noStrike" kern="1200" baseline="0">
+                    <a:solidFill>
+                      <a:schemeClr val="lt1">
+                        <a:lumMod val="75000"/>
+                      </a:schemeClr>
+                    </a:solidFill>
+                    <a:latin typeface="+mn-lt"/>
+                    <a:ea typeface="+mn-ea"/>
+                    <a:cs typeface="+mn-cs"/>
+                  </a:defRPr>
+                </a:pPr>
+                <a:endParaRPr lang="en-US"/>
+              </a:p>
+            </c:txPr>
+            <c:dLblPos val="ctr"/>
+            <c:showLegendKey val="0"/>
+            <c:showVal val="1"/>
+            <c:showCatName val="0"/>
+            <c:showSerName val="0"/>
+            <c:showPercent val="0"/>
+            <c:showBubbleSize val="0"/>
+            <c:showLeaderLines val="0"/>
+            <c:extLst>
+              <c:ext xmlns:c15="http://schemas.microsoft.com/office/drawing/2012/chart" uri="{CE6537A1-D6FC-4f65-9D91-7224C49458BB}">
+                <c15:showLeaderLines val="1"/>
+                <c15:leaderLines>
+                  <c:spPr>
+                    <a:ln w="9525">
+                      <a:solidFill>
+                        <a:schemeClr val="lt1">
+                          <a:lumMod val="50000"/>
+                        </a:schemeClr>
+                      </a:solidFill>
+                      <a:round/>
+                    </a:ln>
+                    <a:effectLst/>
+                  </c:spPr>
+                </c15:leaderLines>
+              </c:ext>
+            </c:extLst>
+          </c:dLbls>
+          <c:cat>
+            <c:numRef>
+              <c:f>Sheet1!$A$2:$A$6</c:f>
+              <c:numCache>
+                <c:formatCode>General</c:formatCode>
+                <c:ptCount val="5"/>
+                <c:pt idx="0">
+                  <c:v>0</c:v>
+                </c:pt>
+                <c:pt idx="1">
+                  <c:v>50</c:v>
+                </c:pt>
+                <c:pt idx="2">
+                  <c:v>100</c:v>
+                </c:pt>
+                <c:pt idx="3">
+                  <c:v>200</c:v>
+                </c:pt>
+                <c:pt idx="4">
+                  <c:v>500</c:v>
+                </c:pt>
+              </c:numCache>
+            </c:numRef>
+          </c:cat>
+          <c:val>
+            <c:numRef>
+              <c:f>Sheet1!$F$2:$F$6</c:f>
+              <c:numCache>
+                <c:formatCode>0.00%</c:formatCode>
+                <c:ptCount val="5"/>
+                <c:pt idx="0">
+                  <c:v>0.99639999999999995</c:v>
+                </c:pt>
+                <c:pt idx="1">
+                  <c:v>0.99639999999999995</c:v>
+                </c:pt>
+                <c:pt idx="2">
+                  <c:v>0.99639999999999995</c:v>
+                </c:pt>
+                <c:pt idx="3" formatCode="0%">
+                  <c:v>1</c:v>
+                </c:pt>
+                <c:pt idx="4" formatCode="0%">
+                  <c:v>1</c:v>
+                </c:pt>
+              </c:numCache>
+            </c:numRef>
+          </c:val>
+          <c:smooth val="0"/>
+          <c:extLst>
+            <c:ext xmlns:c16="http://schemas.microsoft.com/office/drawing/2014/chart" uri="{C3380CC4-5D6E-409C-BE32-E72D297353CC}">
+              <c16:uniqueId val="{00000005-7120-4733-82B4-3D26BBCBB52B}"/>
+            </c:ext>
+          </c:extLst>
+        </c:ser>
+        <c:dLbls>
+          <c:dLblPos val="ctr"/>
+          <c:showLegendKey val="0"/>
+          <c:showVal val="1"/>
+          <c:showCatName val="0"/>
+          <c:showSerName val="0"/>
+          <c:showPercent val="0"/>
+          <c:showBubbleSize val="0"/>
+        </c:dLbls>
+        <c:smooth val="0"/>
+        <c:axId val="331620064"/>
+        <c:axId val="331622032"/>
+      </c:lineChart>
+      <c:catAx>
+        <c:axId val="331620064"/>
+        <c:scaling>
+          <c:orientation val="minMax"/>
+        </c:scaling>
+        <c:delete val="0"/>
+        <c:axPos val="b"/>
+        <c:majorGridlines>
+          <c:spPr>
+            <a:ln w="9525" cap="flat" cmpd="sng" algn="ctr">
+              <a:gradFill>
+                <a:gsLst>
+                  <a:gs pos="100000">
+                    <a:schemeClr val="dk1">
+                      <a:lumMod val="75000"/>
+                      <a:lumOff val="25000"/>
+                    </a:schemeClr>
+                  </a:gs>
+                  <a:gs pos="0">
+                    <a:schemeClr val="dk1">
+                      <a:lumMod val="65000"/>
+                      <a:lumOff val="35000"/>
+                    </a:schemeClr>
+                  </a:gs>
+                </a:gsLst>
+                <a:lin ang="5400000" scaled="0"/>
+              </a:gradFill>
+              <a:round/>
+            </a:ln>
+            <a:effectLst/>
+          </c:spPr>
+        </c:majorGridlines>
+        <c:numFmt formatCode="General" sourceLinked="1"/>
+        <c:majorTickMark val="none"/>
+        <c:minorTickMark val="none"/>
+        <c:tickLblPos val="nextTo"/>
+        <c:spPr>
+          <a:noFill/>
+          <a:ln>
+            <a:noFill/>
+          </a:ln>
+          <a:effectLst/>
+        </c:spPr>
+        <c:txPr>
+          <a:bodyPr rot="-60000000" spcFirstLastPara="1" vertOverflow="ellipsis" vert="horz" wrap="square" anchor="ctr" anchorCtr="1"/>
+          <a:lstStyle/>
+          <a:p>
+            <a:pPr>
+              <a:defRPr sz="1197" b="0" i="0" u="none" strike="noStrike" kern="1200" baseline="0">
+                <a:solidFill>
+                  <a:schemeClr val="lt1">
+                    <a:lumMod val="75000"/>
+                  </a:schemeClr>
+                </a:solidFill>
+                <a:latin typeface="+mn-lt"/>
+                <a:ea typeface="+mn-ea"/>
+                <a:cs typeface="+mn-cs"/>
+              </a:defRPr>
+            </a:pPr>
+            <a:endParaRPr lang="en-US"/>
+          </a:p>
+        </c:txPr>
+        <c:crossAx val="331622032"/>
+        <c:crosses val="autoZero"/>
+        <c:auto val="1"/>
+        <c:lblAlgn val="ctr"/>
+        <c:lblOffset val="100"/>
+        <c:noMultiLvlLbl val="0"/>
+      </c:catAx>
+      <c:valAx>
+        <c:axId val="331622032"/>
+        <c:scaling>
+          <c:orientation val="minMax"/>
+          <c:max val="1"/>
+          <c:min val="0.96500000000000008"/>
+        </c:scaling>
+        <c:delete val="0"/>
+        <c:axPos val="l"/>
+        <c:majorGridlines>
+          <c:spPr>
+            <a:ln w="9525" cap="flat" cmpd="sng" algn="ctr">
+              <a:gradFill>
+                <a:gsLst>
+                  <a:gs pos="100000">
+                    <a:schemeClr val="dk1">
+                      <a:lumMod val="75000"/>
+                      <a:lumOff val="25000"/>
+                    </a:schemeClr>
+                  </a:gs>
+                  <a:gs pos="0">
+                    <a:schemeClr val="dk1">
+                      <a:lumMod val="65000"/>
+                      <a:lumOff val="35000"/>
+                    </a:schemeClr>
+                  </a:gs>
+                </a:gsLst>
+                <a:lin ang="5400000" scaled="0"/>
+              </a:gradFill>
+              <a:round/>
+            </a:ln>
+            <a:effectLst/>
+          </c:spPr>
+        </c:majorGridlines>
+        <c:numFmt formatCode="0.00%" sourceLinked="1"/>
+        <c:majorTickMark val="none"/>
+        <c:minorTickMark val="none"/>
+        <c:tickLblPos val="nextTo"/>
+        <c:spPr>
+          <a:noFill/>
+          <a:ln>
+            <a:noFill/>
+          </a:ln>
+          <a:effectLst/>
+        </c:spPr>
+        <c:txPr>
+          <a:bodyPr rot="-60000000" spcFirstLastPara="1" vertOverflow="ellipsis" vert="horz" wrap="square" anchor="ctr" anchorCtr="1"/>
+          <a:lstStyle/>
+          <a:p>
+            <a:pPr>
+              <a:defRPr sz="1197" b="0" i="0" u="none" strike="noStrike" kern="1200" baseline="0">
+                <a:solidFill>
+                  <a:schemeClr val="lt1">
+                    <a:lumMod val="75000"/>
+                  </a:schemeClr>
+                </a:solidFill>
+                <a:latin typeface="+mn-lt"/>
+                <a:ea typeface="+mn-ea"/>
+                <a:cs typeface="+mn-cs"/>
+              </a:defRPr>
+            </a:pPr>
+            <a:endParaRPr lang="en-US"/>
+          </a:p>
+        </c:txPr>
+        <c:crossAx val="331620064"/>
+        <c:crosses val="autoZero"/>
+        <c:crossBetween val="between"/>
+      </c:valAx>
+      <c:spPr>
+        <a:noFill/>
+        <a:ln>
+          <a:noFill/>
+        </a:ln>
+        <a:effectLst/>
+      </c:spPr>
+    </c:plotArea>
+    <c:legend>
+      <c:legendPos val="t"/>
+      <c:overlay val="0"/>
+      <c:spPr>
+        <a:noFill/>
+        <a:ln>
+          <a:noFill/>
+        </a:ln>
+        <a:effectLst/>
+      </c:spPr>
+      <c:txPr>
+        <a:bodyPr rot="0" spcFirstLastPara="1" vertOverflow="ellipsis" vert="horz" wrap="square" anchor="ctr" anchorCtr="1"/>
+        <a:lstStyle/>
+        <a:p>
+          <a:pPr>
+            <a:defRPr sz="1197" b="0" i="0" u="none" strike="noStrike" kern="1200" baseline="0">
+              <a:solidFill>
+                <a:schemeClr val="lt1">
+                  <a:lumMod val="75000"/>
+                </a:schemeClr>
+              </a:solidFill>
+              <a:latin typeface="+mn-lt"/>
+              <a:ea typeface="+mn-ea"/>
+              <a:cs typeface="+mn-cs"/>
+            </a:defRPr>
+          </a:pPr>
+          <a:endParaRPr lang="en-US"/>
+        </a:p>
+      </c:txPr>
+    </c:legend>
+    <c:plotVisOnly val="1"/>
+    <c:dispBlanksAs val="gap"/>
+    <c:showDLblsOverMax val="0"/>
+  </c:chart>
+  <c:spPr>
+    <a:noFill/>
+    <a:ln w="9525" cap="flat" cmpd="sng" algn="ctr">
+      <a:solidFill>
+        <a:schemeClr val="accent1">
+          <a:alpha val="0"/>
+        </a:schemeClr>
+      </a:solidFill>
+      <a:round/>
+    </a:ln>
+    <a:effectLst/>
+  </c:spPr>
+  <c:txPr>
+    <a:bodyPr/>
+    <a:lstStyle/>
+    <a:p>
+      <a:pPr>
+        <a:defRPr/>
+      </a:pPr>
+      <a:endParaRPr lang="en-US"/>
+    </a:p>
+  </c:txPr>
+  <c:externalData r:id="rId3">
+    <c:autoUpdate val="0"/>
+  </c:externalData>
+</c:chartSpace>
+</file>
+
+<file path=ppt/charts/colors1.xml><?xml version="1.0" encoding="utf-8"?>
+<cs:colorStyle xmlns:cs="http://schemas.microsoft.com/office/drawing/2012/chartStyle" xmlns:a="http://schemas.openxmlformats.org/drawingml/2006/main" meth="cycle" id="10">
+  <a:schemeClr val="accent1"/>
+  <a:schemeClr val="accent2"/>
+  <a:schemeClr val="accent3"/>
+  <a:schemeClr val="accent4"/>
+  <a:schemeClr val="accent5"/>
+  <a:schemeClr val="accent6"/>
+  <cs:variation/>
+  <cs:variation>
+    <a:lumMod val="60000"/>
+  </cs:variation>
+  <cs:variation>
+    <a:lumMod val="80000"/>
+    <a:lumOff val="20000"/>
+  </cs:variation>
+  <cs:variation>
+    <a:lumMod val="80000"/>
+  </cs:variation>
+  <cs:variation>
+    <a:lumMod val="60000"/>
+    <a:lumOff val="40000"/>
+  </cs:variation>
+  <cs:variation>
+    <a:lumMod val="50000"/>
+  </cs:variation>
+  <cs:variation>
+    <a:lumMod val="70000"/>
+    <a:lumOff val="30000"/>
+  </cs:variation>
+  <cs:variation>
+    <a:lumMod val="70000"/>
+  </cs:variation>
+  <cs:variation>
+    <a:lumMod val="50000"/>
+    <a:lumOff val="50000"/>
+  </cs:variation>
+</cs:colorStyle>
+</file>
+
+<file path=ppt/charts/style1.xml><?xml version="1.0" encoding="utf-8"?>
+<cs:chartStyle xmlns:cs="http://schemas.microsoft.com/office/drawing/2012/chartStyle" xmlns:a="http://schemas.openxmlformats.org/drawingml/2006/main" id="236">
+  <cs:axisTitle>
+    <cs:lnRef idx="0"/>
+    <cs:fillRef idx="0"/>
+    <cs:effectRef idx="0"/>
+    <cs:fontRef idx="minor">
+      <a:schemeClr val="lt1">
+        <a:lumMod val="75000"/>
+      </a:schemeClr>
+    </cs:fontRef>
+    <cs:defRPr sz="1197" b="1" kern="1200"/>
+  </cs:axisTitle>
+  <cs:categoryAxis>
+    <cs:lnRef idx="0"/>
+    <cs:fillRef idx="0"/>
+    <cs:effectRef idx="0"/>
+    <cs:fontRef idx="minor">
+      <a:schemeClr val="lt1">
+        <a:lumMod val="75000"/>
+      </a:schemeClr>
+    </cs:fontRef>
+    <cs:defRPr sz="1197" kern="1200"/>
+  </cs:categoryAxis>
+  <cs:chartArea>
+    <cs:lnRef idx="0"/>
+    <cs:fillRef idx="0"/>
+    <cs:effectRef idx="0"/>
+    <cs:fontRef idx="minor">
+      <a:schemeClr val="dk1"/>
+    </cs:fontRef>
+    <cs:spPr>
+      <a:solidFill>
+        <a:schemeClr val="dk1">
+          <a:lumMod val="75000"/>
+          <a:lumOff val="25000"/>
+        </a:schemeClr>
+      </a:solidFill>
+      <a:ln w="9525" cap="flat" cmpd="sng" algn="ctr">
+        <a:solidFill>
+          <a:schemeClr val="dk1">
+            <a:lumMod val="15000"/>
+            <a:lumOff val="85000"/>
+          </a:schemeClr>
+        </a:solidFill>
+        <a:round/>
+      </a:ln>
+    </cs:spPr>
+    <cs:defRPr sz="1197" kern="1200"/>
+  </cs:chartArea>
+  <cs:dataLabel>
+    <cs:lnRef idx="0"/>
+    <cs:fillRef idx="0"/>
+    <cs:effectRef idx="0"/>
+    <cs:fontRef idx="minor">
+      <a:schemeClr val="lt1">
+        <a:lumMod val="75000"/>
+      </a:schemeClr>
+    </cs:fontRef>
+    <cs:defRPr sz="1197" kern="1200"/>
+  </cs:dataLabel>
+  <cs:dataLabelCallout>
+    <cs:lnRef idx="0"/>
+    <cs:fillRef idx="0"/>
+    <cs:effectRef idx="0"/>
+    <cs:fontRef idx="minor">
+      <a:schemeClr val="lt1">
+        <a:lumMod val="15000"/>
+        <a:lumOff val="85000"/>
+      </a:schemeClr>
+    </cs:fontRef>
+    <cs:spPr>
+      <a:solidFill>
+        <a:schemeClr val="dk1">
+          <a:lumMod val="65000"/>
+          <a:lumOff val="35000"/>
+        </a:schemeClr>
+      </a:solidFill>
+    </cs:spPr>
+    <cs:defRPr sz="1197" kern="1200"/>
+    <cs:bodyPr rot="0" spcFirstLastPara="1" vertOverflow="clip" horzOverflow="clip" vert="horz" wrap="square" lIns="36576" tIns="18288" rIns="36576" bIns="18288" anchor="ctr" anchorCtr="1">
+      <a:spAutoFit/>
+    </cs:bodyPr>
+  </cs:dataLabelCallout>
+  <cs:dataPoint>
+    <cs:lnRef idx="0">
+      <cs:styleClr val="auto"/>
+    </cs:lnRef>
+    <cs:fillRef idx="0"/>
+    <cs:effectRef idx="0">
+      <cs:styleClr val="auto"/>
+    </cs:effectRef>
+    <cs:fontRef idx="minor">
+      <a:schemeClr val="dk1"/>
+    </cs:fontRef>
+    <cs:spPr>
+      <a:ln w="9525" cap="flat" cmpd="sng" algn="ctr">
+        <a:solidFill>
+          <a:schemeClr val="phClr"/>
+        </a:solidFill>
+        <a:miter lim="800000"/>
+      </a:ln>
+      <a:effectLst>
+        <a:glow rad="63500">
+          <a:schemeClr val="phClr">
+            <a:satMod val="175000"/>
+            <a:alpha val="25000"/>
+          </a:schemeClr>
+        </a:glow>
+      </a:effectLst>
+    </cs:spPr>
+  </cs:dataPoint>
+  <cs:dataPoint3D>
+    <cs:lnRef idx="0">
+      <cs:styleClr val="auto"/>
+    </cs:lnRef>
+    <cs:fillRef idx="0">
+      <cs:styleClr val="auto"/>
+    </cs:fillRef>
+    <cs:effectRef idx="0">
+      <cs:styleClr val="auto"/>
+    </cs:effectRef>
+    <cs:fontRef idx="minor">
+      <a:schemeClr val="dk1"/>
+    </cs:fontRef>
+    <cs:spPr>
+      <a:ln w="9525" cap="flat" cmpd="sng" algn="ctr">
+        <a:solidFill>
+          <a:schemeClr val="phClr"/>
+        </a:solidFill>
+        <a:miter lim="800000"/>
+      </a:ln>
+      <a:effectLst>
+        <a:glow rad="63500">
+          <a:schemeClr val="phClr">
+            <a:satMod val="175000"/>
+            <a:alpha val="25000"/>
+          </a:schemeClr>
+        </a:glow>
+      </a:effectLst>
+    </cs:spPr>
+  </cs:dataPoint3D>
+  <cs:dataPointLine>
+    <cs:lnRef idx="0">
+      <cs:styleClr val="auto"/>
+    </cs:lnRef>
+    <cs:fillRef idx="0">
+      <cs:styleClr val="auto"/>
+    </cs:fillRef>
+    <cs:effectRef idx="0">
+      <cs:styleClr val="auto"/>
+    </cs:effectRef>
+    <cs:fontRef idx="minor">
+      <a:schemeClr val="dk1"/>
+    </cs:fontRef>
+    <cs:spPr>
+      <a:ln w="22225" cap="rnd">
+        <a:solidFill>
+          <a:schemeClr val="phClr"/>
+        </a:solidFill>
+      </a:ln>
+      <a:effectLst>
+        <a:glow rad="139700">
+          <a:schemeClr val="phClr">
+            <a:satMod val="175000"/>
+            <a:alpha val="14000"/>
+          </a:schemeClr>
+        </a:glow>
+      </a:effectLst>
+    </cs:spPr>
+  </cs:dataPointLine>
+  <cs:dataPointMarker>
+    <cs:lnRef idx="0">
+      <cs:styleClr val="auto"/>
+    </cs:lnRef>
+    <cs:fillRef idx="0">
+      <cs:styleClr val="auto"/>
+    </cs:fillRef>
+    <cs:effectRef idx="0">
+      <cs:styleClr val="auto"/>
+    </cs:effectRef>
+    <cs:fontRef idx="minor">
+      <a:schemeClr val="dk1"/>
+    </cs:fontRef>
+    <cs:spPr>
+      <a:solidFill>
+        <a:schemeClr val="phClr">
+          <a:lumMod val="60000"/>
+          <a:lumOff val="40000"/>
+        </a:schemeClr>
+      </a:solidFill>
+      <a:effectLst>
+        <a:glow rad="63500">
+          <a:schemeClr val="phClr">
+            <a:satMod val="175000"/>
+            <a:alpha val="25000"/>
+          </a:schemeClr>
+        </a:glow>
+      </a:effectLst>
+    </cs:spPr>
+  </cs:dataPointMarker>
+  <cs:dataPointMarkerLayout symbol="circle" size="4"/>
+  <cs:dataPointWireframe>
+    <cs:lnRef idx="0">
+      <cs:styleClr val="auto"/>
+    </cs:lnRef>
+    <cs:fillRef idx="0"/>
+    <cs:effectRef idx="0"/>
+    <cs:fontRef idx="minor">
+      <a:schemeClr val="dk1"/>
+    </cs:fontRef>
+    <cs:spPr>
+      <a:ln w="9525" cap="rnd">
+        <a:solidFill>
+          <a:schemeClr val="phClr"/>
+        </a:solidFill>
+        <a:round/>
+      </a:ln>
+    </cs:spPr>
+  </cs:dataPointWireframe>
+  <cs:dataTable>
+    <cs:lnRef idx="0"/>
+    <cs:fillRef idx="0"/>
+    <cs:effectRef idx="0"/>
+    <cs:fontRef idx="minor">
+      <a:schemeClr val="lt1">
+        <a:lumMod val="75000"/>
+      </a:schemeClr>
+    </cs:fontRef>
+    <cs:spPr>
+      <a:ln w="9525">
+        <a:solidFill>
+          <a:schemeClr val="dk1">
+            <a:lumMod val="50000"/>
+            <a:lumOff val="50000"/>
+          </a:schemeClr>
+        </a:solidFill>
+      </a:ln>
+    </cs:spPr>
+    <cs:defRPr sz="1197" kern="1200"/>
+  </cs:dataTable>
+  <cs:downBar>
+    <cs:lnRef idx="0"/>
+    <cs:fillRef idx="0"/>
+    <cs:effectRef idx="0"/>
+    <cs:fontRef idx="minor">
+      <a:schemeClr val="lt1"/>
+    </cs:fontRef>
+    <cs:spPr>
+      <a:solidFill>
+        <a:schemeClr val="dk1">
+          <a:lumMod val="50000"/>
+          <a:lumOff val="50000"/>
+        </a:schemeClr>
+      </a:solidFill>
+      <a:ln w="9525">
+        <a:solidFill>
+          <a:schemeClr val="dk1">
+            <a:lumMod val="75000"/>
+          </a:schemeClr>
+        </a:solidFill>
+        <a:round/>
+      </a:ln>
+    </cs:spPr>
+  </cs:downBar>
+  <cs:dropLine>
+    <cs:lnRef idx="0"/>
+    <cs:fillRef idx="0"/>
+    <cs:effectRef idx="0"/>
+    <cs:fontRef idx="minor">
+      <a:schemeClr val="dk1"/>
+    </cs:fontRef>
+    <cs:spPr>
+      <a:ln w="9525">
+        <a:solidFill>
+          <a:schemeClr val="lt1">
+            <a:lumMod val="50000"/>
+          </a:schemeClr>
+        </a:solidFill>
+        <a:round/>
+      </a:ln>
+    </cs:spPr>
+  </cs:dropLine>
+  <cs:errorBar>
+    <cs:lnRef idx="0"/>
+    <cs:fillRef idx="0"/>
+    <cs:effectRef idx="0"/>
+    <cs:fontRef idx="minor">
+      <a:schemeClr val="dk1"/>
+    </cs:fontRef>
+    <cs:spPr>
+      <a:ln w="9525">
+        <a:solidFill>
+          <a:schemeClr val="lt1">
+            <a:lumMod val="50000"/>
+          </a:schemeClr>
+        </a:solidFill>
+        <a:round/>
+      </a:ln>
+    </cs:spPr>
+  </cs:errorBar>
+  <cs:floor>
+    <cs:lnRef idx="0"/>
+    <cs:fillRef idx="0"/>
+    <cs:effectRef idx="0"/>
+    <cs:fontRef idx="minor">
+      <a:schemeClr val="dk1"/>
+    </cs:fontRef>
+  </cs:floor>
+  <cs:gridlineMajor>
+    <cs:lnRef idx="0"/>
+    <cs:fillRef idx="0"/>
+    <cs:effectRef idx="0"/>
+    <cs:fontRef idx="minor">
+      <a:schemeClr val="dk1"/>
+    </cs:fontRef>
+    <cs:spPr>
+      <a:ln w="9525" cap="flat" cmpd="sng" algn="ctr">
+        <a:gradFill>
+          <a:gsLst>
+            <a:gs pos="100000">
+              <a:schemeClr val="dk1">
+                <a:lumMod val="75000"/>
+                <a:lumOff val="25000"/>
+              </a:schemeClr>
+            </a:gs>
+            <a:gs pos="0">
+              <a:schemeClr val="dk1">
+                <a:lumMod val="65000"/>
+                <a:lumOff val="35000"/>
+              </a:schemeClr>
+            </a:gs>
+          </a:gsLst>
+          <a:lin ang="5400000" scaled="0"/>
+        </a:gradFill>
+        <a:round/>
+      </a:ln>
+    </cs:spPr>
+  </cs:gridlineMajor>
+  <cs:gridlineMinor>
+    <cs:lnRef idx="0"/>
+    <cs:fillRef idx="0"/>
+    <cs:effectRef idx="0"/>
+    <cs:fontRef idx="minor">
+      <a:schemeClr val="dk1"/>
+    </cs:fontRef>
+    <cs:spPr>
+      <a:ln w="9525" cap="flat" cmpd="sng" algn="ctr">
+        <a:gradFill>
+          <a:gsLst>
+            <a:gs pos="100000">
+              <a:schemeClr val="dk1">
+                <a:lumMod val="75000"/>
+                <a:lumOff val="25000"/>
+                <a:alpha val="25000"/>
+              </a:schemeClr>
+            </a:gs>
+            <a:gs pos="0">
+              <a:schemeClr val="dk1">
+                <a:lumMod val="65000"/>
+                <a:lumOff val="35000"/>
+                <a:alpha val="25000"/>
+              </a:schemeClr>
+            </a:gs>
+          </a:gsLst>
+          <a:lin ang="5400000" scaled="0"/>
+        </a:gradFill>
+        <a:round/>
+      </a:ln>
+    </cs:spPr>
+  </cs:gridlineMinor>
+  <cs:hiLoLine>
+    <cs:lnRef idx="0"/>
+    <cs:fillRef idx="0"/>
+    <cs:effectRef idx="0"/>
+    <cs:fontRef idx="minor">
+      <a:schemeClr val="dk1"/>
+    </cs:fontRef>
+    <cs:spPr>
+      <a:ln w="9525">
+        <a:solidFill>
+          <a:schemeClr val="lt1">
+            <a:lumMod val="50000"/>
+          </a:schemeClr>
+        </a:solidFill>
+        <a:round/>
+      </a:ln>
+    </cs:spPr>
+  </cs:hiLoLine>
+  <cs:leaderLine>
+    <cs:lnRef idx="0"/>
+    <cs:fillRef idx="0"/>
+    <cs:effectRef idx="0"/>
+    <cs:fontRef idx="minor">
+      <a:schemeClr val="dk1"/>
+    </cs:fontRef>
+    <cs:spPr>
+      <a:ln w="9525">
+        <a:solidFill>
+          <a:schemeClr val="lt1">
+            <a:lumMod val="50000"/>
+          </a:schemeClr>
+        </a:solidFill>
+        <a:round/>
+      </a:ln>
+    </cs:spPr>
+  </cs:leaderLine>
+  <cs:legend>
+    <cs:lnRef idx="0"/>
+    <cs:fillRef idx="0"/>
+    <cs:effectRef idx="0"/>
+    <cs:fontRef idx="minor">
+      <a:schemeClr val="lt1">
+        <a:lumMod val="75000"/>
+      </a:schemeClr>
+    </cs:fontRef>
+    <cs:defRPr sz="1197" kern="1200"/>
+  </cs:legend>
+  <cs:plotArea>
+    <cs:lnRef idx="0"/>
+    <cs:fillRef idx="0"/>
+    <cs:effectRef idx="0"/>
+    <cs:fontRef idx="minor">
+      <a:schemeClr val="dk1"/>
+    </cs:fontRef>
+  </cs:plotArea>
+  <cs:plotArea3D>
+    <cs:lnRef idx="0"/>
+    <cs:fillRef idx="0"/>
+    <cs:effectRef idx="0"/>
+    <cs:fontRef idx="minor">
+      <a:schemeClr val="dk1"/>
+    </cs:fontRef>
+  </cs:plotArea3D>
+  <cs:seriesAxis>
+    <cs:lnRef idx="0"/>
+    <cs:fillRef idx="0"/>
+    <cs:effectRef idx="0"/>
+    <cs:fontRef idx="minor">
+      <a:schemeClr val="lt1">
+        <a:lumMod val="75000"/>
+      </a:schemeClr>
+    </cs:fontRef>
+    <cs:defRPr sz="1197" kern="1200"/>
+  </cs:seriesAxis>
+  <cs:seriesLine>
+    <cs:lnRef idx="0"/>
+    <cs:fillRef idx="0"/>
+    <cs:effectRef idx="0"/>
+    <cs:fontRef idx="minor">
+      <a:schemeClr val="dk1"/>
+    </cs:fontRef>
+    <cs:spPr>
+      <a:ln w="9525">
+        <a:solidFill>
+          <a:schemeClr val="lt1">
+            <a:lumMod val="50000"/>
+          </a:schemeClr>
+        </a:solidFill>
+        <a:round/>
+      </a:ln>
+    </cs:spPr>
+  </cs:seriesLine>
+  <cs:title>
+    <cs:lnRef idx="0"/>
+    <cs:fillRef idx="0"/>
+    <cs:effectRef idx="0"/>
+    <cs:fontRef idx="minor">
+      <a:schemeClr val="lt1">
+        <a:lumMod val="85000"/>
+      </a:schemeClr>
+    </cs:fontRef>
+    <cs:defRPr sz="1862" b="1" kern="1200" cap="none" baseline="0"/>
+  </cs:title>
+  <cs:trendline>
+    <cs:lnRef idx="0">
+      <cs:styleClr val="auto"/>
+    </cs:lnRef>
+    <cs:fillRef idx="0"/>
+    <cs:effectRef idx="0"/>
+    <cs:fontRef idx="minor">
+      <a:schemeClr val="lt1"/>
+    </cs:fontRef>
+    <cs:spPr>
+      <a:ln w="25400" cap="rnd">
+        <a:solidFill>
+          <a:schemeClr val="phClr">
+            <a:alpha val="50000"/>
+          </a:schemeClr>
+        </a:solidFill>
+      </a:ln>
+    </cs:spPr>
+  </cs:trendline>
+  <cs:trendlineLabel>
+    <cs:lnRef idx="0"/>
+    <cs:fillRef idx="0"/>
+    <cs:effectRef idx="0"/>
+    <cs:fontRef idx="minor">
+      <a:schemeClr val="lt1">
+        <a:lumMod val="75000"/>
+      </a:schemeClr>
+    </cs:fontRef>
+    <cs:defRPr sz="1197" kern="1200"/>
+  </cs:trendlineLabel>
+  <cs:upBar>
+    <cs:lnRef idx="0"/>
+    <cs:fillRef idx="0"/>
+    <cs:effectRef idx="0"/>
+    <cs:fontRef idx="minor">
+      <a:schemeClr val="dk1"/>
+    </cs:fontRef>
+    <cs:spPr>
+      <a:solidFill>
+        <a:schemeClr val="lt1">
+          <a:lumMod val="85000"/>
+        </a:schemeClr>
+      </a:solidFill>
+      <a:ln w="9525">
+        <a:solidFill>
+          <a:schemeClr val="dk1">
+            <a:lumMod val="50000"/>
+          </a:schemeClr>
+        </a:solidFill>
+        <a:round/>
+      </a:ln>
+    </cs:spPr>
+  </cs:upBar>
+  <cs:valueAxis>
+    <cs:lnRef idx="0"/>
+    <cs:fillRef idx="0"/>
+    <cs:effectRef idx="0"/>
+    <cs:fontRef idx="minor">
+      <a:schemeClr val="lt1">
+        <a:lumMod val="75000"/>
+      </a:schemeClr>
+    </cs:fontRef>
+    <cs:defRPr sz="1197" kern="1200"/>
+  </cs:valueAxis>
+  <cs:wall>
+    <cs:lnRef idx="0"/>
+    <cs:fillRef idx="0"/>
+    <cs:effectRef idx="0"/>
+    <cs:fontRef idx="minor">
+      <a:schemeClr val="dk1"/>
+    </cs:fontRef>
+  </cs:wall>
+</cs:chartStyle>
+</file>
+
+<file path=ppt/notesMasters/notesMaster1.xml><?xml version="1.0" encoding="utf-8"?>
+<p:notesMaster xmlns:a="http://schemas.openxmlformats.org/drawingml/2006/main" xmlns:r="http://schemas.openxmlformats.org/officeDocument/2006/relationships" xmlns:p="http://schemas.openxmlformats.org/presentationml/2006/main">
+  <p:cSld>
+    <p:bg>
+      <p:bgRef idx="1001">
+        <a:schemeClr val="bg1"/>
+      </p:bgRef>
+    </p:bg>
+    <p:spTree>
+      <p:nvGrpSpPr>
+        <p:cNvPr id="1" name=""/>
+        <p:cNvGrpSpPr/>
+        <p:nvPr/>
+      </p:nvGrpSpPr>
+      <p:grpSpPr>
+        <a:xfrm>
+          <a:off x="0" y="0"/>
+          <a:ext cx="0" cy="0"/>
+          <a:chOff x="0" y="0"/>
+          <a:chExt cx="0" cy="0"/>
+        </a:xfrm>
+      </p:grpSpPr>
+      <p:sp>
+        <p:nvSpPr>
+          <p:cNvPr id="2" name="Header Placeholder 1"/>
+          <p:cNvSpPr>
+            <a:spLocks noGrp="1"/>
+          </p:cNvSpPr>
+          <p:nvPr>
+            <p:ph type="hdr" sz="quarter"/>
+          </p:nvPr>
+        </p:nvSpPr>
+        <p:spPr>
+          <a:xfrm>
+            <a:off x="0" y="0"/>
+            <a:ext cx="2971800" cy="458788"/>
+          </a:xfrm>
+          <a:prstGeom prst="rect">
+            <a:avLst/>
+          </a:prstGeom>
+        </p:spPr>
+        <p:txBody>
+          <a:bodyPr vert="horz" lIns="91440" tIns="45720" rIns="91440" bIns="45720" rtlCol="0"/>
+          <a:lstStyle>
+            <a:lvl1pPr algn="l">
+              <a:defRPr sz="1200"/>
+            </a:lvl1pPr>
+          </a:lstStyle>
+          <a:p>
+            <a:endParaRPr lang="en-US"/>
+          </a:p>
+        </p:txBody>
+      </p:sp>
+      <p:sp>
+        <p:nvSpPr>
+          <p:cNvPr id="3" name="Date Placeholder 2"/>
+          <p:cNvSpPr>
+            <a:spLocks noGrp="1"/>
+          </p:cNvSpPr>
+          <p:nvPr>
+            <p:ph type="dt" idx="1"/>
+          </p:nvPr>
+        </p:nvSpPr>
+        <p:spPr>
+          <a:xfrm>
+            <a:off x="3884613" y="0"/>
+            <a:ext cx="2971800" cy="458788"/>
+          </a:xfrm>
+          <a:prstGeom prst="rect">
+            <a:avLst/>
+          </a:prstGeom>
+        </p:spPr>
+        <p:txBody>
+          <a:bodyPr vert="horz" lIns="91440" tIns="45720" rIns="91440" bIns="45720" rtlCol="0"/>
+          <a:lstStyle>
+            <a:lvl1pPr algn="r">
+              <a:defRPr sz="1200"/>
+            </a:lvl1pPr>
+          </a:lstStyle>
+          <a:p>
+            <a:fld id="{4EBAA84A-074F-47D8-AE6E-56CB8016BE64}" type="datetimeFigureOut">
+              <a:rPr lang="en-US" smtClean="0"/>
+              <a:t>6/13/2018</a:t>
+            </a:fld>
+            <a:endParaRPr lang="en-US"/>
+          </a:p>
+        </p:txBody>
+      </p:sp>
+      <p:sp>
+        <p:nvSpPr>
+          <p:cNvPr id="4" name="Slide Image Placeholder 3"/>
+          <p:cNvSpPr>
+            <a:spLocks noGrp="1" noRot="1" noChangeAspect="1"/>
+          </p:cNvSpPr>
+          <p:nvPr>
+            <p:ph type="sldImg" idx="2"/>
+          </p:nvPr>
+        </p:nvSpPr>
+        <p:spPr>
+          <a:xfrm>
+            <a:off x="685800" y="1143000"/>
+            <a:ext cx="5486400" cy="3086100"/>
+          </a:xfrm>
+          <a:prstGeom prst="rect">
+            <a:avLst/>
+          </a:prstGeom>
+          <a:noFill/>
+          <a:ln w="12700">
+            <a:solidFill>
+              <a:prstClr val="black"/>
+            </a:solidFill>
+          </a:ln>
+        </p:spPr>
+        <p:txBody>
+          <a:bodyPr vert="horz" lIns="91440" tIns="45720" rIns="91440" bIns="45720" rtlCol="0" anchor="ctr"/>
+          <a:lstStyle/>
+          <a:p>
+            <a:endParaRPr lang="en-US"/>
+          </a:p>
+        </p:txBody>
+      </p:sp>
+      <p:sp>
+        <p:nvSpPr>
+          <p:cNvPr id="5" name="Notes Placeholder 4"/>
+          <p:cNvSpPr>
+            <a:spLocks noGrp="1"/>
+          </p:cNvSpPr>
+          <p:nvPr>
+            <p:ph type="body" sz="quarter" idx="3"/>
+          </p:nvPr>
+        </p:nvSpPr>
+        <p:spPr>
+          <a:xfrm>
+            <a:off x="685800" y="4400550"/>
+            <a:ext cx="5486400" cy="3600450"/>
+          </a:xfrm>
+          <a:prstGeom prst="rect">
+            <a:avLst/>
+          </a:prstGeom>
+        </p:spPr>
+        <p:txBody>
+          <a:bodyPr vert="horz" lIns="91440" tIns="45720" rIns="91440" bIns="45720" rtlCol="0"/>
+          <a:lstStyle/>
+          <a:p>
+            <a:pPr lvl="0"/>
+            <a:r>
+              <a:rPr lang="en-US"/>
+              <a:t>Edit Master text styles</a:t>
+            </a:r>
+          </a:p>
+          <a:p>
+            <a:pPr lvl="1"/>
+            <a:r>
+              <a:rPr lang="en-US"/>
+              <a:t>Second level</a:t>
+            </a:r>
+          </a:p>
+          <a:p>
+            <a:pPr lvl="2"/>
+            <a:r>
+              <a:rPr lang="en-US"/>
+              <a:t>Third level</a:t>
+            </a:r>
+          </a:p>
+          <a:p>
+            <a:pPr lvl="3"/>
+            <a:r>
+              <a:rPr lang="en-US"/>
+              <a:t>Fourth level</a:t>
+            </a:r>
+          </a:p>
+          <a:p>
+            <a:pPr lvl="4"/>
+            <a:r>
+              <a:rPr lang="en-US"/>
+              <a:t>Fifth level</a:t>
+            </a:r>
+          </a:p>
+        </p:txBody>
+      </p:sp>
+      <p:sp>
+        <p:nvSpPr>
+          <p:cNvPr id="6" name="Footer Placeholder 5"/>
+          <p:cNvSpPr>
+            <a:spLocks noGrp="1"/>
+          </p:cNvSpPr>
+          <p:nvPr>
+            <p:ph type="ftr" sz="quarter" idx="4"/>
+          </p:nvPr>
+        </p:nvSpPr>
+        <p:spPr>
+          <a:xfrm>
+            <a:off x="0" y="8685213"/>
+            <a:ext cx="2971800" cy="458787"/>
+          </a:xfrm>
+          <a:prstGeom prst="rect">
+            <a:avLst/>
+          </a:prstGeom>
+        </p:spPr>
+        <p:txBody>
+          <a:bodyPr vert="horz" lIns="91440" tIns="45720" rIns="91440" bIns="45720" rtlCol="0" anchor="b"/>
+          <a:lstStyle>
+            <a:lvl1pPr algn="l">
+              <a:defRPr sz="1200"/>
+            </a:lvl1pPr>
+          </a:lstStyle>
+          <a:p>
+            <a:endParaRPr lang="en-US"/>
+          </a:p>
+        </p:txBody>
+      </p:sp>
+      <p:sp>
+        <p:nvSpPr>
+          <p:cNvPr id="7" name="Slide Number Placeholder 6"/>
+          <p:cNvSpPr>
+            <a:spLocks noGrp="1"/>
+          </p:cNvSpPr>
+          <p:nvPr>
+            <p:ph type="sldNum" sz="quarter" idx="5"/>
+          </p:nvPr>
+        </p:nvSpPr>
+        <p:spPr>
+          <a:xfrm>
+            <a:off x="3884613" y="8685213"/>
+            <a:ext cx="2971800" cy="458787"/>
+          </a:xfrm>
+          <a:prstGeom prst="rect">
+            <a:avLst/>
+          </a:prstGeom>
+        </p:spPr>
+        <p:txBody>
+          <a:bodyPr vert="horz" lIns="91440" tIns="45720" rIns="91440" bIns="45720" rtlCol="0" anchor="b"/>
+          <a:lstStyle>
+            <a:lvl1pPr algn="r">
+              <a:defRPr sz="1200"/>
+            </a:lvl1pPr>
+          </a:lstStyle>
+          <a:p>
+            <a:fld id="{F7832BF8-98AF-4BE6-8CCD-6CB075B6D8B5}" type="slidenum">
+              <a:rPr lang="en-US" smtClean="0"/>
+              <a:t>‹#›</a:t>
+            </a:fld>
+            <a:endParaRPr lang="en-US"/>
+          </a:p>
+        </p:txBody>
+      </p:sp>
+    </p:spTree>
+    <p:extLst>
+      <p:ext uri="{BB962C8B-B14F-4D97-AF65-F5344CB8AC3E}">
+        <p14:creationId xmlns:p14="http://schemas.microsoft.com/office/powerpoint/2010/main" val="2004952842"/>
+      </p:ext>
+    </p:extLst>
+  </p:cSld>
+  <p:clrMap bg1="lt1" tx1="dk1" bg2="lt2" tx2="dk2" accent1="accent1" accent2="accent2" accent3="accent3" accent4="accent4" accent5="accent5" accent6="accent6" hlink="hlink" folHlink="folHlink"/>
+  <p:notesStyle>
+    <a:lvl1pPr marL="0" algn="l" defTabSz="914400" rtl="0" eaLnBrk="1" latinLnBrk="0" hangingPunct="1">
+      <a:defRPr sz="1200" kern="1200">
+        <a:solidFill>
+          <a:schemeClr val="tx1"/>
+        </a:solidFill>
+        <a:latin typeface="+mn-lt"/>
+        <a:ea typeface="+mn-ea"/>
+        <a:cs typeface="+mn-cs"/>
+      </a:defRPr>
+    </a:lvl1pPr>
+    <a:lvl2pPr marL="457200" algn="l" defTabSz="914400" rtl="0" eaLnBrk="1" latinLnBrk="0" hangingPunct="1">
+      <a:defRPr sz="1200" kern="1200">
+        <a:solidFill>
+          <a:schemeClr val="tx1"/>
+        </a:solidFill>
+        <a:latin typeface="+mn-lt"/>
+        <a:ea typeface="+mn-ea"/>
+        <a:cs typeface="+mn-cs"/>
+      </a:defRPr>
+    </a:lvl2pPr>
+    <a:lvl3pPr marL="914400" algn="l" defTabSz="914400" rtl="0" eaLnBrk="1" latinLnBrk="0" hangingPunct="1">
+      <a:defRPr sz="1200" kern="1200">
+        <a:solidFill>
+          <a:schemeClr val="tx1"/>
+        </a:solidFill>
+        <a:latin typeface="+mn-lt"/>
+        <a:ea typeface="+mn-ea"/>
+        <a:cs typeface="+mn-cs"/>
+      </a:defRPr>
+    </a:lvl3pPr>
+    <a:lvl4pPr marL="1371600" algn="l" defTabSz="914400" rtl="0" eaLnBrk="1" latinLnBrk="0" hangingPunct="1">
+      <a:defRPr sz="1200" kern="1200">
+        <a:solidFill>
+          <a:schemeClr val="tx1"/>
+        </a:solidFill>
+        <a:latin typeface="+mn-lt"/>
+        <a:ea typeface="+mn-ea"/>
+        <a:cs typeface="+mn-cs"/>
+      </a:defRPr>
+    </a:lvl4pPr>
+    <a:lvl5pPr marL="1828800" algn="l" defTabSz="914400" rtl="0" eaLnBrk="1" latinLnBrk="0" hangingPunct="1">
+      <a:defRPr sz="1200" kern="1200">
+        <a:solidFill>
+          <a:schemeClr val="tx1"/>
+        </a:solidFill>
+        <a:latin typeface="+mn-lt"/>
+        <a:ea typeface="+mn-ea"/>
+        <a:cs typeface="+mn-cs"/>
+      </a:defRPr>
+    </a:lvl5pPr>
+    <a:lvl6pPr marL="2286000" algn="l" defTabSz="914400" rtl="0" eaLnBrk="1" latinLnBrk="0" hangingPunct="1">
+      <a:defRPr sz="1200" kern="1200">
+        <a:solidFill>
+          <a:schemeClr val="tx1"/>
+        </a:solidFill>
+        <a:latin typeface="+mn-lt"/>
+        <a:ea typeface="+mn-ea"/>
+        <a:cs typeface="+mn-cs"/>
+      </a:defRPr>
+    </a:lvl6pPr>
+    <a:lvl7pPr marL="2743200" algn="l" defTabSz="914400" rtl="0" eaLnBrk="1" latinLnBrk="0" hangingPunct="1">
+      <a:defRPr sz="1200" kern="1200">
+        <a:solidFill>
+          <a:schemeClr val="tx1"/>
+        </a:solidFill>
+        <a:latin typeface="+mn-lt"/>
+        <a:ea typeface="+mn-ea"/>
+        <a:cs typeface="+mn-cs"/>
+      </a:defRPr>
+    </a:lvl7pPr>
+    <a:lvl8pPr marL="3200400" algn="l" defTabSz="914400" rtl="0" eaLnBrk="1" latinLnBrk="0" hangingPunct="1">
+      <a:defRPr sz="1200" kern="1200">
+        <a:solidFill>
+          <a:schemeClr val="tx1"/>
+        </a:solidFill>
+        <a:latin typeface="+mn-lt"/>
+        <a:ea typeface="+mn-ea"/>
+        <a:cs typeface="+mn-cs"/>
+      </a:defRPr>
+    </a:lvl8pPr>
+    <a:lvl9pPr marL="3657600" algn="l" defTabSz="914400" rtl="0" eaLnBrk="1" latinLnBrk="0" hangingPunct="1">
+      <a:defRPr sz="1200" kern="1200">
+        <a:solidFill>
+          <a:schemeClr val="tx1"/>
+        </a:solidFill>
+        <a:latin typeface="+mn-lt"/>
+        <a:ea typeface="+mn-ea"/>
+        <a:cs typeface="+mn-cs"/>
+      </a:defRPr>
+    </a:lvl9pPr>
+  </p:notesStyle>
+</p:notesMaster>
+</file>
+
+<file path=ppt/notesSlides/notesSlide1.xml><?xml version="1.0" encoding="utf-8"?>
+<p:notes xmlns:a="http://schemas.openxmlformats.org/drawingml/2006/main" xmlns:r="http://schemas.openxmlformats.org/officeDocument/2006/relationships" xmlns:p="http://schemas.openxmlformats.org/presentationml/2006/main">
+  <p:cSld>
+    <p:spTree>
+      <p:nvGrpSpPr>
+        <p:cNvPr id="1" name=""/>
+        <p:cNvGrpSpPr/>
+        <p:nvPr/>
+      </p:nvGrpSpPr>
+      <p:grpSpPr>
+        <a:xfrm>
+          <a:off x="0" y="0"/>
+          <a:ext cx="0" cy="0"/>
+          <a:chOff x="0" y="0"/>
+          <a:chExt cx="0" cy="0"/>
+        </a:xfrm>
+      </p:grpSpPr>
+      <p:sp>
+        <p:nvSpPr>
+          <p:cNvPr id="2" name="Slide Image Placeholder 1"/>
+          <p:cNvSpPr>
+            <a:spLocks noGrp="1" noRot="1" noChangeAspect="1"/>
+          </p:cNvSpPr>
+          <p:nvPr>
+            <p:ph type="sldImg"/>
+          </p:nvPr>
+        </p:nvSpPr>
+        <p:spPr/>
+      </p:sp>
+      <p:sp>
+        <p:nvSpPr>
+          <p:cNvPr id="3" name="Notes Placeholder 2"/>
+          <p:cNvSpPr>
+            <a:spLocks noGrp="1"/>
+          </p:cNvSpPr>
+          <p:nvPr>
+            <p:ph type="body" idx="1"/>
+          </p:nvPr>
+        </p:nvSpPr>
+        <p:spPr/>
+        <p:txBody>
+          <a:bodyPr/>
+          <a:lstStyle/>
+          <a:p>
+            <a:pPr marL="228600" indent="-228600">
+              <a:buAutoNum type="arabicPeriod"/>
+            </a:pPr>
+            <a:r>
+              <a:rPr lang="en-US" dirty="0"/>
+              <a:t>KNN &amp; NN only misclassified the data point closest to the centroid we drifted towards.</a:t>
+            </a:r>
+          </a:p>
+          <a:p>
+            <a:pPr marL="228600" indent="-228600">
+              <a:buAutoNum type="arabicPeriod"/>
+            </a:pPr>
+            <a:r>
+              <a:rPr lang="en-US" dirty="0"/>
+              <a:t>Linear SVC &amp; Gaussian misclassified several data points around the centroid.</a:t>
+            </a:r>
+          </a:p>
+          <a:p>
+            <a:pPr marL="228600" indent="-228600">
+              <a:buAutoNum type="arabicPeriod"/>
+            </a:pPr>
+            <a:r>
+              <a:rPr lang="en-US" dirty="0"/>
+              <a:t>Random Forest thwarted the attack at each stage.</a:t>
+            </a:r>
+          </a:p>
+        </p:txBody>
+      </p:sp>
+      <p:sp>
+        <p:nvSpPr>
+          <p:cNvPr id="4" name="Slide Number Placeholder 3"/>
+          <p:cNvSpPr>
+            <a:spLocks noGrp="1"/>
+          </p:cNvSpPr>
+          <p:nvPr>
+            <p:ph type="sldNum" sz="quarter" idx="10"/>
+          </p:nvPr>
+        </p:nvSpPr>
+        <p:spPr/>
+        <p:txBody>
+          <a:bodyPr/>
+          <a:lstStyle/>
+          <a:p>
+            <a:fld id="{F7832BF8-98AF-4BE6-8CCD-6CB075B6D8B5}" type="slidenum">
+              <a:rPr lang="en-US" smtClean="0"/>
+              <a:t>11</a:t>
+            </a:fld>
+            <a:endParaRPr lang="en-US"/>
+          </a:p>
+        </p:txBody>
+      </p:sp>
+    </p:spTree>
+    <p:extLst>
+      <p:ext uri="{BB962C8B-B14F-4D97-AF65-F5344CB8AC3E}">
+        <p14:creationId xmlns:p14="http://schemas.microsoft.com/office/powerpoint/2010/main" val="1849933522"/>
+      </p:ext>
+    </p:extLst>
+  </p:cSld>
+  <p:clrMapOvr>
+    <a:masterClrMapping/>
+  </p:clrMapOvr>
+</p:notes>
+</file>
+
+<file path=ppt/notesSlides/notesSlide2.xml><?xml version="1.0" encoding="utf-8"?>
+<p:notes xmlns:a="http://schemas.openxmlformats.org/drawingml/2006/main" xmlns:r="http://schemas.openxmlformats.org/officeDocument/2006/relationships" xmlns:p="http://schemas.openxmlformats.org/presentationml/2006/main">
+  <p:cSld>
+    <p:spTree>
+      <p:nvGrpSpPr>
+        <p:cNvPr id="1" name=""/>
+        <p:cNvGrpSpPr/>
+        <p:nvPr/>
+      </p:nvGrpSpPr>
+      <p:grpSpPr>
+        <a:xfrm>
+          <a:off x="0" y="0"/>
+          <a:ext cx="0" cy="0"/>
+          <a:chOff x="0" y="0"/>
+          <a:chExt cx="0" cy="0"/>
+        </a:xfrm>
+      </p:grpSpPr>
+      <p:sp>
+        <p:nvSpPr>
+          <p:cNvPr id="2" name="Slide Image Placeholder 1"/>
+          <p:cNvSpPr>
+            <a:spLocks noGrp="1" noRot="1" noChangeAspect="1"/>
+          </p:cNvSpPr>
+          <p:nvPr>
+            <p:ph type="sldImg"/>
+          </p:nvPr>
+        </p:nvSpPr>
+        <p:spPr/>
+      </p:sp>
+      <p:sp>
+        <p:nvSpPr>
+          <p:cNvPr id="3" name="Notes Placeholder 2"/>
+          <p:cNvSpPr>
+            <a:spLocks noGrp="1"/>
+          </p:cNvSpPr>
+          <p:nvPr>
+            <p:ph type="body" idx="1"/>
+          </p:nvPr>
+        </p:nvSpPr>
+        <p:spPr/>
+        <p:txBody>
+          <a:bodyPr/>
+          <a:lstStyle/>
+          <a:p>
+            <a:r>
+              <a:rPr lang="en-US" dirty="0"/>
+              <a:t>Why is Random forest immune to FBA? Possibly because Random forest constructs a bunch of decision trees at training time, and the output classification is the mean prediction of individual trees. Since we started with a data point that was furthest out from the centroid of the positive mean, it didn’t take the decision trees based on feature values closer to the positive centroid to weigh in against the tree on </a:t>
+            </a:r>
+            <a:r>
+              <a:rPr lang="en-US"/>
+              <a:t>the edge.</a:t>
+            </a:r>
+            <a:endParaRPr lang="en-US" dirty="0"/>
+          </a:p>
+        </p:txBody>
+      </p:sp>
+      <p:sp>
+        <p:nvSpPr>
+          <p:cNvPr id="4" name="Slide Number Placeholder 3"/>
+          <p:cNvSpPr>
+            <a:spLocks noGrp="1"/>
+          </p:cNvSpPr>
+          <p:nvPr>
+            <p:ph type="sldNum" sz="quarter" idx="10"/>
+          </p:nvPr>
+        </p:nvSpPr>
+        <p:spPr/>
+        <p:txBody>
+          <a:bodyPr/>
+          <a:lstStyle/>
+          <a:p>
+            <a:fld id="{F7832BF8-98AF-4BE6-8CCD-6CB075B6D8B5}" type="slidenum">
+              <a:rPr lang="en-US" smtClean="0"/>
+              <a:t>12</a:t>
+            </a:fld>
+            <a:endParaRPr lang="en-US"/>
+          </a:p>
+        </p:txBody>
+      </p:sp>
+    </p:spTree>
+    <p:extLst>
+      <p:ext uri="{BB962C8B-B14F-4D97-AF65-F5344CB8AC3E}">
+        <p14:creationId xmlns:p14="http://schemas.microsoft.com/office/powerpoint/2010/main" val="714346895"/>
+      </p:ext>
+    </p:extLst>
+  </p:cSld>
+  <p:clrMapOvr>
+    <a:masterClrMapping/>
+  </p:clrMapOvr>
+</p:notes>
+</file>
+
 <file path=ppt/slideLayouts/slideLayout1.xml><?xml version="1.0" encoding="utf-8"?>
 <p:sldLayout xmlns:a="http://schemas.openxmlformats.org/drawingml/2006/main" xmlns:r="http://schemas.openxmlformats.org/officeDocument/2006/relationships" xmlns:p="http://schemas.openxmlformats.org/presentationml/2006/main" type="title" preserve="1">
   <p:cSld name="Title Slide">
@@ -352,7 +2456,7 @@
             <a:fld id="{B61BEF0D-F0BB-DE4B-95CE-6DB70DBA9567}" type="datetimeFigureOut">
               <a:rPr lang="en-US" dirty="0"/>
               <a:pPr/>
-              <a:t>6/11/18</a:t>
+              <a:t>6/13/2018</a:t>
             </a:fld>
             <a:endParaRPr lang="en-US" dirty="0"/>
           </a:p>
@@ -683,7 +2787,7 @@
             <a:fld id="{B61BEF0D-F0BB-DE4B-95CE-6DB70DBA9567}" type="datetimeFigureOut">
               <a:rPr lang="en-US" dirty="0"/>
               <a:pPr/>
-              <a:t>6/11/18</a:t>
+              <a:t>6/13/2018</a:t>
             </a:fld>
             <a:endParaRPr lang="en-US" dirty="0"/>
           </a:p>
@@ -958,7 +3062,7 @@
             <a:fld id="{B61BEF0D-F0BB-DE4B-95CE-6DB70DBA9567}" type="datetimeFigureOut">
               <a:rPr lang="en-US" dirty="0"/>
               <a:pPr/>
-              <a:t>6/11/18</a:t>
+              <a:t>6/13/2018</a:t>
             </a:fld>
             <a:endParaRPr lang="en-US" dirty="0"/>
           </a:p>
@@ -1523,7 +3627,7 @@
             <a:fld id="{B61BEF0D-F0BB-DE4B-95CE-6DB70DBA9567}" type="datetimeFigureOut">
               <a:rPr lang="en-US" dirty="0"/>
               <a:pPr/>
-              <a:t>6/11/18</a:t>
+              <a:t>6/13/2018</a:t>
             </a:fld>
             <a:endParaRPr lang="en-US" dirty="0"/>
           </a:p>
@@ -1798,7 +3902,7 @@
             <a:fld id="{B61BEF0D-F0BB-DE4B-95CE-6DB70DBA9567}" type="datetimeFigureOut">
               <a:rPr lang="en-US" dirty="0"/>
               <a:pPr/>
-              <a:t>6/11/18</a:t>
+              <a:t>6/13/2018</a:t>
             </a:fld>
             <a:endParaRPr lang="en-US" dirty="0"/>
           </a:p>
@@ -2357,7 +4461,7 @@
             <a:fld id="{B61BEF0D-F0BB-DE4B-95CE-6DB70DBA9567}" type="datetimeFigureOut">
               <a:rPr lang="en-US" dirty="0"/>
               <a:pPr/>
-              <a:t>6/11/18</a:t>
+              <a:t>6/13/2018</a:t>
             </a:fld>
             <a:endParaRPr lang="en-US" dirty="0"/>
           </a:p>
@@ -2681,7 +4785,7 @@
             <a:fld id="{B61BEF0D-F0BB-DE4B-95CE-6DB70DBA9567}" type="datetimeFigureOut">
               <a:rPr lang="en-US" dirty="0"/>
               <a:pPr/>
-              <a:t>6/11/18</a:t>
+              <a:t>6/13/2018</a:t>
             </a:fld>
             <a:endParaRPr lang="en-US" dirty="0"/>
           </a:p>
@@ -2855,7 +4959,7 @@
             <a:fld id="{B61BEF0D-F0BB-DE4B-95CE-6DB70DBA9567}" type="datetimeFigureOut">
               <a:rPr lang="en-US" dirty="0"/>
               <a:pPr/>
-              <a:t>6/11/18</a:t>
+              <a:t>6/13/2018</a:t>
             </a:fld>
             <a:endParaRPr lang="en-US" dirty="0"/>
           </a:p>
@@ -3090,7 +5194,7 @@
             <a:fld id="{B61BEF0D-F0BB-DE4B-95CE-6DB70DBA9567}" type="datetimeFigureOut">
               <a:rPr lang="en-US" dirty="0"/>
               <a:pPr/>
-              <a:t>6/11/18</a:t>
+              <a:t>6/13/2018</a:t>
             </a:fld>
             <a:endParaRPr lang="en-US" dirty="0"/>
           </a:p>
@@ -3287,7 +5391,7 @@
             <a:fld id="{B61BEF0D-F0BB-DE4B-95CE-6DB70DBA9567}" type="datetimeFigureOut">
               <a:rPr lang="en-US" dirty="0"/>
               <a:pPr/>
-              <a:t>6/11/18</a:t>
+              <a:t>6/13/2018</a:t>
             </a:fld>
             <a:endParaRPr lang="en-US" dirty="0"/>
           </a:p>
@@ -3560,7 +5664,7 @@
             <a:fld id="{B61BEF0D-F0BB-DE4B-95CE-6DB70DBA9567}" type="datetimeFigureOut">
               <a:rPr lang="en-US" dirty="0"/>
               <a:pPr/>
-              <a:t>6/11/18</a:t>
+              <a:t>6/13/2018</a:t>
             </a:fld>
             <a:endParaRPr lang="en-US" dirty="0"/>
           </a:p>
@@ -3823,7 +5927,7 @@
             <a:fld id="{B61BEF0D-F0BB-DE4B-95CE-6DB70DBA9567}" type="datetimeFigureOut">
               <a:rPr lang="en-US" dirty="0"/>
               <a:pPr/>
-              <a:t>6/11/18</a:t>
+              <a:t>6/13/2018</a:t>
             </a:fld>
             <a:endParaRPr lang="en-US" dirty="0"/>
           </a:p>
@@ -4194,7 +6298,7 @@
             <a:fld id="{B61BEF0D-F0BB-DE4B-95CE-6DB70DBA9567}" type="datetimeFigureOut">
               <a:rPr lang="en-US" dirty="0"/>
               <a:pPr/>
-              <a:t>6/11/18</a:t>
+              <a:t>6/13/2018</a:t>
             </a:fld>
             <a:endParaRPr lang="en-US" dirty="0"/>
           </a:p>
@@ -4339,7 +6443,7 @@
             <a:fld id="{B61BEF0D-F0BB-DE4B-95CE-6DB70DBA9567}" type="datetimeFigureOut">
               <a:rPr lang="en-US" dirty="0"/>
               <a:pPr/>
-              <a:t>6/11/18</a:t>
+              <a:t>6/13/2018</a:t>
             </a:fld>
             <a:endParaRPr lang="en-US" dirty="0"/>
           </a:p>
@@ -4461,7 +6565,7 @@
             <a:fld id="{B61BEF0D-F0BB-DE4B-95CE-6DB70DBA9567}" type="datetimeFigureOut">
               <a:rPr lang="en-US" dirty="0"/>
               <a:pPr/>
-              <a:t>6/11/18</a:t>
+              <a:t>6/13/2018</a:t>
             </a:fld>
             <a:endParaRPr lang="en-US" dirty="0"/>
           </a:p>
@@ -4743,7 +6847,7 @@
             <a:fld id="{B61BEF0D-F0BB-DE4B-95CE-6DB70DBA9567}" type="datetimeFigureOut">
               <a:rPr lang="en-US" dirty="0"/>
               <a:pPr/>
-              <a:t>6/11/18</a:t>
+              <a:t>6/13/2018</a:t>
             </a:fld>
             <a:endParaRPr lang="en-US" dirty="0"/>
           </a:p>
@@ -5064,7 +7168,7 @@
             <a:fld id="{B61BEF0D-F0BB-DE4B-95CE-6DB70DBA9567}" type="datetimeFigureOut">
               <a:rPr lang="en-US" dirty="0"/>
               <a:pPr/>
-              <a:t>6/11/18</a:t>
+              <a:t>6/13/2018</a:t>
             </a:fld>
             <a:endParaRPr lang="en-US" dirty="0"/>
           </a:p>
@@ -5275,7 +7379,7 @@
             <a:fld id="{B61BEF0D-F0BB-DE4B-95CE-6DB70DBA9567}" type="datetimeFigureOut">
               <a:rPr lang="en-US" dirty="0"/>
               <a:pPr/>
-              <a:t>6/11/18</a:t>
+              <a:t>6/13/2018</a:t>
             </a:fld>
             <a:endParaRPr lang="en-US" dirty="0"/>
           </a:p>
@@ -5968,6 +8072,453 @@
           <p:cNvPr id="2" name="Title 1">
             <a:extLst>
               <a:ext uri="{FF2B5EF4-FFF2-40B4-BE49-F238E27FC236}">
+                <a16:creationId xmlns:a16="http://schemas.microsoft.com/office/drawing/2014/main" id="{A6F52681-2E20-479A-AADA-BEDB38FFAC66}"/>
+              </a:ext>
+            </a:extLst>
+          </p:cNvPr>
+          <p:cNvSpPr>
+            <a:spLocks noGrp="1"/>
+          </p:cNvSpPr>
+          <p:nvPr>
+            <p:ph type="title"/>
+          </p:nvPr>
+        </p:nvSpPr>
+        <p:spPr/>
+        <p:txBody>
+          <a:bodyPr/>
+          <a:lstStyle/>
+          <a:p>
+            <a:r>
+              <a:rPr lang="en-US" dirty="0"/>
+              <a:t>FBA – Our implementation</a:t>
+            </a:r>
+          </a:p>
+        </p:txBody>
+      </p:sp>
+      <p:sp>
+        <p:nvSpPr>
+          <p:cNvPr id="3" name="Content Placeholder 2">
+            <a:extLst>
+              <a:ext uri="{FF2B5EF4-FFF2-40B4-BE49-F238E27FC236}">
+                <a16:creationId xmlns:a16="http://schemas.microsoft.com/office/drawing/2014/main" id="{4E949059-08E2-4418-83E9-A142C2F631F6}"/>
+              </a:ext>
+            </a:extLst>
+          </p:cNvPr>
+          <p:cNvSpPr>
+            <a:spLocks noGrp="1"/>
+          </p:cNvSpPr>
+          <p:nvPr>
+            <p:ph idx="1"/>
+          </p:nvPr>
+        </p:nvSpPr>
+        <p:spPr/>
+        <p:txBody>
+          <a:bodyPr/>
+          <a:lstStyle/>
+          <a:p>
+            <a:r>
+              <a:rPr lang="en-US" dirty="0"/>
+              <a:t>Split dataset into training and test.</a:t>
+            </a:r>
+          </a:p>
+          <a:p>
+            <a:r>
+              <a:rPr lang="en-US" dirty="0"/>
+              <a:t>Over N iterations</a:t>
+            </a:r>
+          </a:p>
+          <a:p>
+            <a:pPr lvl="1"/>
+            <a:r>
+              <a:rPr lang="en-US" dirty="0"/>
+              <a:t>Calculate new corrupt data record.</a:t>
+            </a:r>
+          </a:p>
+          <a:p>
+            <a:pPr lvl="1"/>
+            <a:r>
+              <a:rPr lang="en-US" dirty="0"/>
+              <a:t>Insert into training set.</a:t>
+            </a:r>
+          </a:p>
+          <a:p>
+            <a:pPr lvl="1"/>
+            <a:r>
+              <a:rPr lang="en-US" dirty="0"/>
+              <a:t>Fit training data.</a:t>
+            </a:r>
+          </a:p>
+          <a:p>
+            <a:pPr lvl="1"/>
+            <a:r>
+              <a:rPr lang="en-US" dirty="0"/>
+              <a:t>Classify the corrupt record.</a:t>
+            </a:r>
+          </a:p>
+          <a:p>
+            <a:pPr lvl="1"/>
+            <a:r>
+              <a:rPr lang="en-US" dirty="0"/>
+              <a:t>If detected, stop. Else continue</a:t>
+            </a:r>
+          </a:p>
+          <a:p>
+            <a:r>
+              <a:rPr lang="en-US" dirty="0"/>
+              <a:t>Classify test set, and find differences.</a:t>
+            </a:r>
+          </a:p>
+          <a:p>
+            <a:pPr lvl="1"/>
+            <a:endParaRPr lang="en-US" dirty="0"/>
+          </a:p>
+          <a:p>
+            <a:endParaRPr lang="en-US" dirty="0"/>
+          </a:p>
+        </p:txBody>
+      </p:sp>
+    </p:spTree>
+    <p:extLst>
+      <p:ext uri="{BB962C8B-B14F-4D97-AF65-F5344CB8AC3E}">
+        <p14:creationId xmlns:p14="http://schemas.microsoft.com/office/powerpoint/2010/main" val="2399456298"/>
+      </p:ext>
+    </p:extLst>
+  </p:cSld>
+  <p:clrMapOvr>
+    <a:masterClrMapping/>
+  </p:clrMapOvr>
+</p:sld>
+</file>
+
+<file path=ppt/slides/slide11.xml><?xml version="1.0" encoding="utf-8"?>
+<p:sld xmlns:a="http://schemas.openxmlformats.org/drawingml/2006/main" xmlns:r="http://schemas.openxmlformats.org/officeDocument/2006/relationships" xmlns:p="http://schemas.openxmlformats.org/presentationml/2006/main">
+  <p:cSld>
+    <p:spTree>
+      <p:nvGrpSpPr>
+        <p:cNvPr id="1" name=""/>
+        <p:cNvGrpSpPr/>
+        <p:nvPr/>
+      </p:nvGrpSpPr>
+      <p:grpSpPr>
+        <a:xfrm>
+          <a:off x="0" y="0"/>
+          <a:ext cx="0" cy="0"/>
+          <a:chOff x="0" y="0"/>
+          <a:chExt cx="0" cy="0"/>
+        </a:xfrm>
+      </p:grpSpPr>
+      <p:sp>
+        <p:nvSpPr>
+          <p:cNvPr id="2" name="Title 1">
+            <a:extLst>
+              <a:ext uri="{FF2B5EF4-FFF2-40B4-BE49-F238E27FC236}">
+                <a16:creationId xmlns:a16="http://schemas.microsoft.com/office/drawing/2014/main" id="{B5374770-5BC6-4E66-9E2A-408BEB05B200}"/>
+              </a:ext>
+            </a:extLst>
+          </p:cNvPr>
+          <p:cNvSpPr>
+            <a:spLocks noGrp="1"/>
+          </p:cNvSpPr>
+          <p:nvPr>
+            <p:ph type="title"/>
+          </p:nvPr>
+        </p:nvSpPr>
+        <p:spPr/>
+        <p:txBody>
+          <a:bodyPr/>
+          <a:lstStyle/>
+          <a:p>
+            <a:r>
+              <a:rPr lang="en-US" dirty="0"/>
+              <a:t>Classifier accuracies post attack</a:t>
+            </a:r>
+          </a:p>
+        </p:txBody>
+      </p:sp>
+      <p:graphicFrame>
+        <p:nvGraphicFramePr>
+          <p:cNvPr id="6" name="Content Placeholder 5">
+            <a:extLst>
+              <a:ext uri="{FF2B5EF4-FFF2-40B4-BE49-F238E27FC236}">
+                <a16:creationId xmlns:a16="http://schemas.microsoft.com/office/drawing/2014/main" id="{C68AEBAF-770B-470F-BF69-223AF1307F7D}"/>
+              </a:ext>
+            </a:extLst>
+          </p:cNvPr>
+          <p:cNvGraphicFramePr>
+            <a:graphicFrameLocks noGrp="1"/>
+          </p:cNvGraphicFramePr>
+          <p:nvPr>
+            <p:ph idx="1"/>
+            <p:extLst>
+              <p:ext uri="{D42A27DB-BD31-4B8C-83A1-F6EECF244321}">
+                <p14:modId xmlns:p14="http://schemas.microsoft.com/office/powerpoint/2010/main" val="1924092469"/>
+              </p:ext>
+            </p:extLst>
+          </p:nvPr>
+        </p:nvGraphicFramePr>
+        <p:xfrm>
+          <a:off x="685800" y="1868129"/>
+          <a:ext cx="10131425" cy="4395019"/>
+        </p:xfrm>
+        <a:graphic>
+          <a:graphicData uri="http://schemas.openxmlformats.org/drawingml/2006/chart">
+            <c:chart xmlns:c="http://schemas.openxmlformats.org/drawingml/2006/chart" xmlns:r="http://schemas.openxmlformats.org/officeDocument/2006/relationships" r:id="rId3"/>
+          </a:graphicData>
+        </a:graphic>
+      </p:graphicFrame>
+    </p:spTree>
+    <p:extLst>
+      <p:ext uri="{BB962C8B-B14F-4D97-AF65-F5344CB8AC3E}">
+        <p14:creationId xmlns:p14="http://schemas.microsoft.com/office/powerpoint/2010/main" val="4068059375"/>
+      </p:ext>
+    </p:extLst>
+  </p:cSld>
+  <p:clrMapOvr>
+    <a:masterClrMapping/>
+  </p:clrMapOvr>
+</p:sld>
+</file>
+
+<file path=ppt/slides/slide12.xml><?xml version="1.0" encoding="utf-8"?>
+<p:sld xmlns:a="http://schemas.openxmlformats.org/drawingml/2006/main" xmlns:r="http://schemas.openxmlformats.org/officeDocument/2006/relationships" xmlns:p="http://schemas.openxmlformats.org/presentationml/2006/main">
+  <p:cSld>
+    <p:spTree>
+      <p:nvGrpSpPr>
+        <p:cNvPr id="1" name=""/>
+        <p:cNvGrpSpPr/>
+        <p:nvPr/>
+      </p:nvGrpSpPr>
+      <p:grpSpPr>
+        <a:xfrm>
+          <a:off x="0" y="0"/>
+          <a:ext cx="0" cy="0"/>
+          <a:chOff x="0" y="0"/>
+          <a:chExt cx="0" cy="0"/>
+        </a:xfrm>
+      </p:grpSpPr>
+      <p:sp>
+        <p:nvSpPr>
+          <p:cNvPr id="2" name="Title 1">
+            <a:extLst>
+              <a:ext uri="{FF2B5EF4-FFF2-40B4-BE49-F238E27FC236}">
+                <a16:creationId xmlns:a16="http://schemas.microsoft.com/office/drawing/2014/main" id="{63D424F7-71C8-4F6A-95C0-BFB8E175B79D}"/>
+              </a:ext>
+            </a:extLst>
+          </p:cNvPr>
+          <p:cNvSpPr>
+            <a:spLocks noGrp="1"/>
+          </p:cNvSpPr>
+          <p:nvPr>
+            <p:ph type="title"/>
+          </p:nvPr>
+        </p:nvSpPr>
+        <p:spPr/>
+        <p:txBody>
+          <a:bodyPr/>
+          <a:lstStyle/>
+          <a:p>
+            <a:r>
+              <a:rPr lang="en-US" dirty="0"/>
+              <a:t>The random forest anomaly</a:t>
+            </a:r>
+          </a:p>
+        </p:txBody>
+      </p:sp>
+      <p:sp>
+        <p:nvSpPr>
+          <p:cNvPr id="3" name="Content Placeholder 2">
+            <a:extLst>
+              <a:ext uri="{FF2B5EF4-FFF2-40B4-BE49-F238E27FC236}">
+                <a16:creationId xmlns:a16="http://schemas.microsoft.com/office/drawing/2014/main" id="{1A94CA07-9C91-4ACA-8D14-84613D1D6020}"/>
+              </a:ext>
+            </a:extLst>
+          </p:cNvPr>
+          <p:cNvSpPr>
+            <a:spLocks noGrp="1"/>
+          </p:cNvSpPr>
+          <p:nvPr>
+            <p:ph idx="1"/>
+          </p:nvPr>
+        </p:nvSpPr>
+        <p:spPr/>
+        <p:txBody>
+          <a:bodyPr/>
+          <a:lstStyle/>
+          <a:p>
+            <a:r>
+              <a:rPr lang="en-US" dirty="0"/>
+              <a:t>Our FBA didn’t work when we chose Random Forest</a:t>
+            </a:r>
+          </a:p>
+          <a:p>
+            <a:r>
+              <a:rPr lang="en-US" dirty="0"/>
+              <a:t>In fact </a:t>
+            </a:r>
+          </a:p>
+          <a:p>
+            <a:pPr lvl="1"/>
+            <a:r>
+              <a:rPr lang="en-US" dirty="0"/>
+              <a:t>Accuracy increased.</a:t>
+            </a:r>
+          </a:p>
+          <a:p>
+            <a:pPr lvl="1"/>
+            <a:r>
+              <a:rPr lang="en-US" dirty="0"/>
+              <a:t>Didn’t complete full iteration count.</a:t>
+            </a:r>
+          </a:p>
+          <a:p>
+            <a:r>
+              <a:rPr lang="en-US" dirty="0"/>
+              <a:t>Why?</a:t>
+            </a:r>
+          </a:p>
+          <a:p>
+            <a:endParaRPr lang="en-US" dirty="0"/>
+          </a:p>
+        </p:txBody>
+      </p:sp>
+    </p:spTree>
+    <p:extLst>
+      <p:ext uri="{BB962C8B-B14F-4D97-AF65-F5344CB8AC3E}">
+        <p14:creationId xmlns:p14="http://schemas.microsoft.com/office/powerpoint/2010/main" val="3573238528"/>
+      </p:ext>
+    </p:extLst>
+  </p:cSld>
+  <p:clrMapOvr>
+    <a:masterClrMapping/>
+  </p:clrMapOvr>
+</p:sld>
+</file>
+
+<file path=ppt/slides/slide13.xml><?xml version="1.0" encoding="utf-8"?>
+<p:sld xmlns:a="http://schemas.openxmlformats.org/drawingml/2006/main" xmlns:r="http://schemas.openxmlformats.org/officeDocument/2006/relationships" xmlns:p="http://schemas.openxmlformats.org/presentationml/2006/main">
+  <p:cSld>
+    <p:spTree>
+      <p:nvGrpSpPr>
+        <p:cNvPr id="1" name=""/>
+        <p:cNvGrpSpPr/>
+        <p:nvPr/>
+      </p:nvGrpSpPr>
+      <p:grpSpPr>
+        <a:xfrm>
+          <a:off x="0" y="0"/>
+          <a:ext cx="0" cy="0"/>
+          <a:chOff x="0" y="0"/>
+          <a:chExt cx="0" cy="0"/>
+        </a:xfrm>
+      </p:grpSpPr>
+      <p:sp>
+        <p:nvSpPr>
+          <p:cNvPr id="2" name="Title 1">
+            <a:extLst>
+              <a:ext uri="{FF2B5EF4-FFF2-40B4-BE49-F238E27FC236}">
+                <a16:creationId xmlns:a16="http://schemas.microsoft.com/office/drawing/2014/main" id="{0692CCF1-C858-4271-9A3C-BDF207984FC5}"/>
+              </a:ext>
+            </a:extLst>
+          </p:cNvPr>
+          <p:cNvSpPr>
+            <a:spLocks noGrp="1"/>
+          </p:cNvSpPr>
+          <p:nvPr>
+            <p:ph type="title"/>
+          </p:nvPr>
+        </p:nvSpPr>
+        <p:spPr/>
+        <p:txBody>
+          <a:bodyPr/>
+          <a:lstStyle/>
+          <a:p>
+            <a:r>
+              <a:rPr lang="en-US" dirty="0"/>
+              <a:t>Counter-measures to </a:t>
+            </a:r>
+            <a:r>
+              <a:rPr lang="en-US" dirty="0" err="1"/>
+              <a:t>fba</a:t>
+            </a:r>
+            <a:endParaRPr lang="en-US" dirty="0"/>
+          </a:p>
+        </p:txBody>
+      </p:sp>
+      <p:sp>
+        <p:nvSpPr>
+          <p:cNvPr id="3" name="Content Placeholder 2">
+            <a:extLst>
+              <a:ext uri="{FF2B5EF4-FFF2-40B4-BE49-F238E27FC236}">
+                <a16:creationId xmlns:a16="http://schemas.microsoft.com/office/drawing/2014/main" id="{126F3F66-CA80-4B67-8386-2AACE5096DF2}"/>
+              </a:ext>
+            </a:extLst>
+          </p:cNvPr>
+          <p:cNvSpPr>
+            <a:spLocks noGrp="1"/>
+          </p:cNvSpPr>
+          <p:nvPr>
+            <p:ph idx="1"/>
+          </p:nvPr>
+        </p:nvSpPr>
+        <p:spPr/>
+        <p:txBody>
+          <a:bodyPr/>
+          <a:lstStyle/>
+          <a:p>
+            <a:r>
+              <a:rPr lang="en-US" dirty="0"/>
+              <a:t>Freeze online training</a:t>
+            </a:r>
+          </a:p>
+          <a:p>
+            <a:r>
+              <a:rPr lang="en-US" dirty="0"/>
+              <a:t>Autocorrelation detection</a:t>
+            </a:r>
+          </a:p>
+          <a:p>
+            <a:r>
+              <a:rPr lang="en-US" dirty="0"/>
+              <a:t>Batched model updates</a:t>
+            </a:r>
+          </a:p>
+        </p:txBody>
+      </p:sp>
+    </p:spTree>
+    <p:extLst>
+      <p:ext uri="{BB962C8B-B14F-4D97-AF65-F5344CB8AC3E}">
+        <p14:creationId xmlns:p14="http://schemas.microsoft.com/office/powerpoint/2010/main" val="2296113909"/>
+      </p:ext>
+    </p:extLst>
+  </p:cSld>
+  <p:clrMapOvr>
+    <a:masterClrMapping/>
+  </p:clrMapOvr>
+</p:sld>
+</file>
+
+<file path=ppt/slides/slide14.xml><?xml version="1.0" encoding="utf-8"?>
+<p:sld xmlns:a="http://schemas.openxmlformats.org/drawingml/2006/main" xmlns:r="http://schemas.openxmlformats.org/officeDocument/2006/relationships" xmlns:p="http://schemas.openxmlformats.org/presentationml/2006/main">
+  <p:cSld>
+    <p:spTree>
+      <p:nvGrpSpPr>
+        <p:cNvPr id="1" name=""/>
+        <p:cNvGrpSpPr/>
+        <p:nvPr/>
+      </p:nvGrpSpPr>
+      <p:grpSpPr>
+        <a:xfrm>
+          <a:off x="0" y="0"/>
+          <a:ext cx="0" cy="0"/>
+          <a:chOff x="0" y="0"/>
+          <a:chExt cx="0" cy="0"/>
+        </a:xfrm>
+      </p:grpSpPr>
+      <p:sp>
+        <p:nvSpPr>
+          <p:cNvPr id="2" name="Title 1">
+            <a:extLst>
+              <a:ext uri="{FF2B5EF4-FFF2-40B4-BE49-F238E27FC236}">
                 <a16:creationId xmlns:a16="http://schemas.microsoft.com/office/drawing/2014/main" id="{5325B127-AFF1-A64B-AABA-A8491CAC4D99}"/>
               </a:ext>
             </a:extLst>
@@ -6050,7 +8601,7 @@
 </p:sld>
 </file>
 
-<file path=ppt/slides/slide11.xml><?xml version="1.0" encoding="utf-8"?>
+<file path=ppt/slides/slide15.xml><?xml version="1.0" encoding="utf-8"?>
 <p:sld xmlns:a="http://schemas.openxmlformats.org/drawingml/2006/main" xmlns:r="http://schemas.openxmlformats.org/officeDocument/2006/relationships" xmlns:p="http://schemas.openxmlformats.org/presentationml/2006/main">
   <p:cSld>
     <p:spTree>
@@ -7796,7 +10347,7 @@
           <a:p>
             <a:r>
               <a:rPr lang="en-US" dirty="0"/>
-              <a:t>Boiling Frog attack</a:t>
+              <a:t>FROG BOILING ATTACK (FBA)</a:t>
             </a:r>
           </a:p>
         </p:txBody>
@@ -7821,6 +10372,44 @@
         <p:txBody>
           <a:bodyPr/>
           <a:lstStyle/>
+          <a:p>
+            <a:r>
+              <a:rPr lang="en-US" dirty="0"/>
+              <a:t>Only feasible when model is adaptive.</a:t>
+            </a:r>
+          </a:p>
+          <a:p>
+            <a:r>
+              <a:rPr lang="en-US" dirty="0"/>
+              <a:t>Works on concept of template drift.</a:t>
+            </a:r>
+          </a:p>
+          <a:p>
+            <a:pPr marL="0" indent="0">
+              <a:buNone/>
+            </a:pPr>
+            <a:r>
+              <a:rPr lang="nn-NO" i="1" dirty="0"/>
+              <a:t>				F</a:t>
+            </a:r>
+            <a:r>
+              <a:rPr lang="nn-NO" i="1" baseline="-25000" dirty="0"/>
+              <a:t>new</a:t>
+            </a:r>
+            <a:r>
+              <a:rPr lang="nn-NO" i="1" dirty="0"/>
+              <a:t> = F</a:t>
+            </a:r>
+            <a:r>
+              <a:rPr lang="nn-NO" i="1" baseline="-25000" dirty="0"/>
+              <a:t>old</a:t>
+            </a:r>
+            <a:r>
+              <a:rPr lang="nn-NO" i="1" dirty="0"/>
+              <a:t> + (i − 1)δ(x)</a:t>
+            </a:r>
+            <a:endParaRPr lang="en-US" i="1" dirty="0"/>
+          </a:p>
           <a:p>
             <a:endParaRPr lang="en-US" dirty="0"/>
           </a:p>
@@ -8086,4 +10675,299 @@
     </a:ext>
   </a:extLst>
 </a:theme>
+</file>
+
+<file path=ppt/theme/theme2.xml><?xml version="1.0" encoding="utf-8"?>
+<a:theme xmlns:a="http://schemas.openxmlformats.org/drawingml/2006/main" name="Office Theme">
+  <a:themeElements>
+    <a:clrScheme name="Office">
+      <a:dk1>
+        <a:sysClr val="windowText" lastClr="000000"/>
+      </a:dk1>
+      <a:lt1>
+        <a:sysClr val="window" lastClr="FFFFFF"/>
+      </a:lt1>
+      <a:dk2>
+        <a:srgbClr val="44546A"/>
+      </a:dk2>
+      <a:lt2>
+        <a:srgbClr val="E7E6E6"/>
+      </a:lt2>
+      <a:accent1>
+        <a:srgbClr val="4472C4"/>
+      </a:accent1>
+      <a:accent2>
+        <a:srgbClr val="ED7D31"/>
+      </a:accent2>
+      <a:accent3>
+        <a:srgbClr val="A5A5A5"/>
+      </a:accent3>
+      <a:accent4>
+        <a:srgbClr val="FFC000"/>
+      </a:accent4>
+      <a:accent5>
+        <a:srgbClr val="5B9BD5"/>
+      </a:accent5>
+      <a:accent6>
+        <a:srgbClr val="70AD47"/>
+      </a:accent6>
+      <a:hlink>
+        <a:srgbClr val="0563C1"/>
+      </a:hlink>
+      <a:folHlink>
+        <a:srgbClr val="954F72"/>
+      </a:folHlink>
+    </a:clrScheme>
+    <a:fontScheme name="Office">
+      <a:majorFont>
+        <a:latin typeface="Calibri Light" panose="020F0302020204030204"/>
+        <a:ea typeface=""/>
+        <a:cs typeface=""/>
+        <a:font script="Jpan" typeface="游ゴシック Light"/>
+        <a:font script="Hang" typeface="맑은 고딕"/>
+        <a:font script="Hans" typeface="等线 Light"/>
+        <a:font script="Hant" typeface="新細明體"/>
+        <a:font script="Arab" typeface="Times New Roman"/>
+        <a:font script="Hebr" typeface="Times New Roman"/>
+        <a:font script="Thai" typeface="Angsana New"/>
+        <a:font script="Ethi" typeface="Nyala"/>
+        <a:font script="Beng" typeface="Vrinda"/>
+        <a:font script="Gujr" typeface="Shruti"/>
+        <a:font script="Khmr" typeface="MoolBoran"/>
+        <a:font script="Knda" typeface="Tunga"/>
+        <a:font script="Guru" typeface="Raavi"/>
+        <a:font script="Cans" typeface="Euphemia"/>
+        <a:font script="Cher" typeface="Plantagenet Cherokee"/>
+        <a:font script="Yiii" typeface="Microsoft Yi Baiti"/>
+        <a:font script="Tibt" typeface="Microsoft Himalaya"/>
+        <a:font script="Thaa" typeface="MV Boli"/>
+        <a:font script="Deva" typeface="Mangal"/>
+        <a:font script="Telu" typeface="Gautami"/>
+        <a:font script="Taml" typeface="Latha"/>
+        <a:font script="Syrc" typeface="Estrangelo Edessa"/>
+        <a:font script="Orya" typeface="Kalinga"/>
+        <a:font script="Mlym" typeface="Kartika"/>
+        <a:font script="Laoo" typeface="DokChampa"/>
+        <a:font script="Sinh" typeface="Iskoola Pota"/>
+        <a:font script="Mong" typeface="Mongolian Baiti"/>
+        <a:font script="Viet" typeface="Times New Roman"/>
+        <a:font script="Uigh" typeface="Microsoft Uighur"/>
+        <a:font script="Geor" typeface="Sylfaen"/>
+        <a:font script="Armn" typeface="Arial"/>
+        <a:font script="Bugi" typeface="Leelawadee UI"/>
+        <a:font script="Bopo" typeface="Microsoft JhengHei"/>
+        <a:font script="Java" typeface="Javanese Text"/>
+        <a:font script="Lisu" typeface="Segoe UI"/>
+        <a:font script="Mymr" typeface="Myanmar Text"/>
+        <a:font script="Nkoo" typeface="Ebrima"/>
+        <a:font script="Olck" typeface="Nirmala UI"/>
+        <a:font script="Osma" typeface="Ebrima"/>
+        <a:font script="Phag" typeface="Phagspa"/>
+        <a:font script="Syrn" typeface="Estrangelo Edessa"/>
+        <a:font script="Syrj" typeface="Estrangelo Edessa"/>
+        <a:font script="Syre" typeface="Estrangelo Edessa"/>
+        <a:font script="Sora" typeface="Nirmala UI"/>
+        <a:font script="Tale" typeface="Microsoft Tai Le"/>
+        <a:font script="Talu" typeface="Microsoft New Tai Lue"/>
+        <a:font script="Tfng" typeface="Ebrima"/>
+      </a:majorFont>
+      <a:minorFont>
+        <a:latin typeface="Calibri" panose="020F0502020204030204"/>
+        <a:ea typeface=""/>
+        <a:cs typeface=""/>
+        <a:font script="Jpan" typeface="游ゴシック"/>
+        <a:font script="Hang" typeface="맑은 고딕"/>
+        <a:font script="Hans" typeface="等线"/>
+        <a:font script="Hant" typeface="新細明體"/>
+        <a:font script="Arab" typeface="Arial"/>
+        <a:font script="Hebr" typeface="Arial"/>
+        <a:font script="Thai" typeface="Cordia New"/>
+        <a:font script="Ethi" typeface="Nyala"/>
+        <a:font script="Beng" typeface="Vrinda"/>
+        <a:font script="Gujr" typeface="Shruti"/>
+        <a:font script="Khmr" typeface="DaunPenh"/>
+        <a:font script="Knda" typeface="Tunga"/>
+        <a:font script="Guru" typeface="Raavi"/>
+        <a:font script="Cans" typeface="Euphemia"/>
+        <a:font script="Cher" typeface="Plantagenet Cherokee"/>
+        <a:font script="Yiii" typeface="Microsoft Yi Baiti"/>
+        <a:font script="Tibt" typeface="Microsoft Himalaya"/>
+        <a:font script="Thaa" typeface="MV Boli"/>
+        <a:font script="Deva" typeface="Mangal"/>
+        <a:font script="Telu" typeface="Gautami"/>
+        <a:font script="Taml" typeface="Latha"/>
+        <a:font script="Syrc" typeface="Estrangelo Edessa"/>
+        <a:font script="Orya" typeface="Kalinga"/>
+        <a:font script="Mlym" typeface="Kartika"/>
+        <a:font script="Laoo" typeface="DokChampa"/>
+        <a:font script="Sinh" typeface="Iskoola Pota"/>
+        <a:font script="Mong" typeface="Mongolian Baiti"/>
+        <a:font script="Viet" typeface="Arial"/>
+        <a:font script="Uigh" typeface="Microsoft Uighur"/>
+        <a:font script="Geor" typeface="Sylfaen"/>
+        <a:font script="Armn" typeface="Arial"/>
+        <a:font script="Bugi" typeface="Leelawadee UI"/>
+        <a:font script="Bopo" typeface="Microsoft JhengHei"/>
+        <a:font script="Java" typeface="Javanese Text"/>
+        <a:font script="Lisu" typeface="Segoe UI"/>
+        <a:font script="Mymr" typeface="Myanmar Text"/>
+        <a:font script="Nkoo" typeface="Ebrima"/>
+        <a:font script="Olck" typeface="Nirmala UI"/>
+        <a:font script="Osma" typeface="Ebrima"/>
+        <a:font script="Phag" typeface="Phagspa"/>
+        <a:font script="Syrn" typeface="Estrangelo Edessa"/>
+        <a:font script="Syrj" typeface="Estrangelo Edessa"/>
+        <a:font script="Syre" typeface="Estrangelo Edessa"/>
+        <a:font script="Sora" typeface="Nirmala UI"/>
+        <a:font script="Tale" typeface="Microsoft Tai Le"/>
+        <a:font script="Talu" typeface="Microsoft New Tai Lue"/>
+        <a:font script="Tfng" typeface="Ebrima"/>
+      </a:minorFont>
+    </a:fontScheme>
+    <a:fmtScheme name="Office">
+      <a:fillStyleLst>
+        <a:solidFill>
+          <a:schemeClr val="phClr"/>
+        </a:solidFill>
+        <a:gradFill rotWithShape="1">
+          <a:gsLst>
+            <a:gs pos="0">
+              <a:schemeClr val="phClr">
+                <a:lumMod val="110000"/>
+                <a:satMod val="105000"/>
+                <a:tint val="67000"/>
+              </a:schemeClr>
+            </a:gs>
+            <a:gs pos="50000">
+              <a:schemeClr val="phClr">
+                <a:lumMod val="105000"/>
+                <a:satMod val="103000"/>
+                <a:tint val="73000"/>
+              </a:schemeClr>
+            </a:gs>
+            <a:gs pos="100000">
+              <a:schemeClr val="phClr">
+                <a:lumMod val="105000"/>
+                <a:satMod val="109000"/>
+                <a:tint val="81000"/>
+              </a:schemeClr>
+            </a:gs>
+          </a:gsLst>
+          <a:lin ang="5400000" scaled="0"/>
+        </a:gradFill>
+        <a:gradFill rotWithShape="1">
+          <a:gsLst>
+            <a:gs pos="0">
+              <a:schemeClr val="phClr">
+                <a:satMod val="103000"/>
+                <a:lumMod val="102000"/>
+                <a:tint val="94000"/>
+              </a:schemeClr>
+            </a:gs>
+            <a:gs pos="50000">
+              <a:schemeClr val="phClr">
+                <a:satMod val="110000"/>
+                <a:lumMod val="100000"/>
+                <a:shade val="100000"/>
+              </a:schemeClr>
+            </a:gs>
+            <a:gs pos="100000">
+              <a:schemeClr val="phClr">
+                <a:lumMod val="99000"/>
+                <a:satMod val="120000"/>
+                <a:shade val="78000"/>
+              </a:schemeClr>
+            </a:gs>
+          </a:gsLst>
+          <a:lin ang="5400000" scaled="0"/>
+        </a:gradFill>
+      </a:fillStyleLst>
+      <a:lnStyleLst>
+        <a:ln w="6350" cap="flat" cmpd="sng" algn="ctr">
+          <a:solidFill>
+            <a:schemeClr val="phClr"/>
+          </a:solidFill>
+          <a:prstDash val="solid"/>
+          <a:miter lim="800000"/>
+        </a:ln>
+        <a:ln w="12700" cap="flat" cmpd="sng" algn="ctr">
+          <a:solidFill>
+            <a:schemeClr val="phClr"/>
+          </a:solidFill>
+          <a:prstDash val="solid"/>
+          <a:miter lim="800000"/>
+        </a:ln>
+        <a:ln w="19050" cap="flat" cmpd="sng" algn="ctr">
+          <a:solidFill>
+            <a:schemeClr val="phClr"/>
+          </a:solidFill>
+          <a:prstDash val="solid"/>
+          <a:miter lim="800000"/>
+        </a:ln>
+      </a:lnStyleLst>
+      <a:effectStyleLst>
+        <a:effectStyle>
+          <a:effectLst/>
+        </a:effectStyle>
+        <a:effectStyle>
+          <a:effectLst/>
+        </a:effectStyle>
+        <a:effectStyle>
+          <a:effectLst>
+            <a:outerShdw blurRad="57150" dist="19050" dir="5400000" algn="ctr" rotWithShape="0">
+              <a:srgbClr val="000000">
+                <a:alpha val="63000"/>
+              </a:srgbClr>
+            </a:outerShdw>
+          </a:effectLst>
+        </a:effectStyle>
+      </a:effectStyleLst>
+      <a:bgFillStyleLst>
+        <a:solidFill>
+          <a:schemeClr val="phClr"/>
+        </a:solidFill>
+        <a:solidFill>
+          <a:schemeClr val="phClr">
+            <a:tint val="95000"/>
+            <a:satMod val="170000"/>
+          </a:schemeClr>
+        </a:solidFill>
+        <a:gradFill rotWithShape="1">
+          <a:gsLst>
+            <a:gs pos="0">
+              <a:schemeClr val="phClr">
+                <a:tint val="93000"/>
+                <a:satMod val="150000"/>
+                <a:shade val="98000"/>
+                <a:lumMod val="102000"/>
+              </a:schemeClr>
+            </a:gs>
+            <a:gs pos="50000">
+              <a:schemeClr val="phClr">
+                <a:tint val="98000"/>
+                <a:satMod val="130000"/>
+                <a:shade val="90000"/>
+                <a:lumMod val="103000"/>
+              </a:schemeClr>
+            </a:gs>
+            <a:gs pos="100000">
+              <a:schemeClr val="phClr">
+                <a:shade val="63000"/>
+                <a:satMod val="120000"/>
+              </a:schemeClr>
+            </a:gs>
+          </a:gsLst>
+          <a:lin ang="5400000" scaled="0"/>
+        </a:gradFill>
+      </a:bgFillStyleLst>
+    </a:fmtScheme>
+  </a:themeElements>
+  <a:objectDefaults/>
+  <a:extraClrSchemeLst/>
+  <a:extLst>
+    <a:ext uri="{05A4C25C-085E-4340-85A3-A5531E510DB2}">
+      <thm15:themeFamily xmlns:thm15="http://schemas.microsoft.com/office/thememl/2012/main" name="Office Theme" id="{62F939B6-93AF-4DB8-9C6B-D6C7DFDC589F}" vid="{4A3C46E8-61CC-4603-A589-7422A47A8E4A}"/>
+    </a:ext>
+  </a:extLst>
+</a:theme>
 </file>
</xml_diff>